<commit_message>
Update newest notebook & slide
</commit_message>
<xml_diff>
--- a/Slide.pptx
+++ b/Slide.pptx
@@ -35,12 +35,18 @@
     <p:sldId id="294" r:id="rId29"/>
     <p:sldId id="270" r:id="rId30"/>
     <p:sldId id="297" r:id="rId31"/>
-    <p:sldId id="298" r:id="rId32"/>
-    <p:sldId id="273" r:id="rId33"/>
-    <p:sldId id="275" r:id="rId34"/>
-    <p:sldId id="276" r:id="rId35"/>
-    <p:sldId id="278" r:id="rId36"/>
-    <p:sldId id="279" r:id="rId37"/>
+    <p:sldId id="299" r:id="rId32"/>
+    <p:sldId id="300" r:id="rId33"/>
+    <p:sldId id="301" r:id="rId34"/>
+    <p:sldId id="302" r:id="rId35"/>
+    <p:sldId id="298" r:id="rId36"/>
+    <p:sldId id="273" r:id="rId37"/>
+    <p:sldId id="304" r:id="rId38"/>
+    <p:sldId id="275" r:id="rId39"/>
+    <p:sldId id="303" r:id="rId40"/>
+    <p:sldId id="276" r:id="rId41"/>
+    <p:sldId id="278" r:id="rId42"/>
+    <p:sldId id="279" r:id="rId43"/>
   </p:sldIdLst>
   <p:sldSz cx="12192000" cy="6858000"/>
   <p:notesSz cx="6858000" cy="9144000"/>
@@ -145,7 +151,7 @@
 <file path=ppt/revisionInfo.xml><?xml version="1.0" encoding="utf-8"?>
 <p1510:revInfo xmlns:a="http://schemas.openxmlformats.org/drawingml/2006/main" xmlns:r="http://schemas.openxmlformats.org/officeDocument/2006/relationships" xmlns:p1510="http://schemas.microsoft.com/office/powerpoint/2015/10/main">
   <p1510:revLst>
-    <p1510:client id="{827A363B-7D48-4E31-8D14-C53C430A7CDA}" v="76" dt="2021-01-15T19:22:19.676"/>
+    <p1510:client id="{827A363B-7D48-4E31-8D14-C53C430A7CDA}" v="97" dt="2021-01-16T03:14:34.933"/>
   </p1510:revLst>
 </p1510:revInfo>
 </file>
@@ -155,7 +161,7 @@
   <pc:docChgLst>
     <pc:chgData name="VŨ ĐĂNG HOÀNG LONG" userId="a7f37be1-0431-4d22-a98c-6d73ca78dda1" providerId="ADAL" clId="{827A363B-7D48-4E31-8D14-C53C430A7CDA}"/>
     <pc:docChg chg="undo custSel addSld delSld modSld sldOrd modMainMaster">
-      <pc:chgData name="VŨ ĐĂNG HOÀNG LONG" userId="a7f37be1-0431-4d22-a98c-6d73ca78dda1" providerId="ADAL" clId="{827A363B-7D48-4E31-8D14-C53C430A7CDA}" dt="2021-01-15T21:56:08.604" v="9123" actId="20577"/>
+      <pc:chgData name="VŨ ĐĂNG HOÀNG LONG" userId="a7f37be1-0431-4d22-a98c-6d73ca78dda1" providerId="ADAL" clId="{827A363B-7D48-4E31-8D14-C53C430A7CDA}" dt="2021-01-16T03:14:34.933" v="11045"/>
       <pc:docMkLst>
         <pc:docMk/>
       </pc:docMkLst>
@@ -506,7 +512,7 @@
         </pc:picChg>
       </pc:sldChg>
       <pc:sldChg chg="modSp add mod">
-        <pc:chgData name="VŨ ĐĂNG HOÀNG LONG" userId="a7f37be1-0431-4d22-a98c-6d73ca78dda1" providerId="ADAL" clId="{827A363B-7D48-4E31-8D14-C53C430A7CDA}" dt="2021-01-15T21:54:21.667" v="8866" actId="20577"/>
+        <pc:chgData name="VŨ ĐĂNG HOÀNG LONG" userId="a7f37be1-0431-4d22-a98c-6d73ca78dda1" providerId="ADAL" clId="{827A363B-7D48-4E31-8D14-C53C430A7CDA}" dt="2021-01-16T00:04:41.109" v="9569" actId="20577"/>
         <pc:sldMkLst>
           <pc:docMk/>
           <pc:sldMk cId="695566616" sldId="270"/>
@@ -520,7 +526,7 @@
           </ac:spMkLst>
         </pc:spChg>
         <pc:spChg chg="mod">
-          <ac:chgData name="VŨ ĐĂNG HOÀNG LONG" userId="a7f37be1-0431-4d22-a98c-6d73ca78dda1" providerId="ADAL" clId="{827A363B-7D48-4E31-8D14-C53C430A7CDA}" dt="2021-01-15T21:54:21.667" v="8866" actId="20577"/>
+          <ac:chgData name="VŨ ĐĂNG HOÀNG LONG" userId="a7f37be1-0431-4d22-a98c-6d73ca78dda1" providerId="ADAL" clId="{827A363B-7D48-4E31-8D14-C53C430A7CDA}" dt="2021-01-16T00:04:41.109" v="9569" actId="20577"/>
           <ac:spMkLst>
             <pc:docMk/>
             <pc:sldMk cId="695566616" sldId="270"/>
@@ -589,34 +595,58 @@
         </pc:spChg>
       </pc:sldChg>
       <pc:sldChg chg="modSp add mod">
-        <pc:chgData name="VŨ ĐĂNG HOÀNG LONG" userId="a7f37be1-0431-4d22-a98c-6d73ca78dda1" providerId="ADAL" clId="{827A363B-7D48-4E31-8D14-C53C430A7CDA}" dt="2021-01-15T17:52:17.576" v="2834" actId="20577"/>
+        <pc:chgData name="VŨ ĐĂNG HOÀNG LONG" userId="a7f37be1-0431-4d22-a98c-6d73ca78dda1" providerId="ADAL" clId="{827A363B-7D48-4E31-8D14-C53C430A7CDA}" dt="2021-01-16T03:14:34.933" v="11045"/>
         <pc:sldMkLst>
           <pc:docMk/>
           <pc:sldMk cId="3068223525" sldId="275"/>
         </pc:sldMkLst>
         <pc:spChg chg="mod">
-          <ac:chgData name="VŨ ĐĂNG HOÀNG LONG" userId="a7f37be1-0431-4d22-a98c-6d73ca78dda1" providerId="ADAL" clId="{827A363B-7D48-4E31-8D14-C53C430A7CDA}" dt="2021-01-15T17:52:17.576" v="2834" actId="20577"/>
+          <ac:chgData name="VŨ ĐĂNG HOÀNG LONG" userId="a7f37be1-0431-4d22-a98c-6d73ca78dda1" providerId="ADAL" clId="{827A363B-7D48-4E31-8D14-C53C430A7CDA}" dt="2021-01-16T01:02:58.881" v="10399" actId="20577"/>
           <ac:spMkLst>
             <pc:docMk/>
             <pc:sldMk cId="3068223525" sldId="275"/>
             <ac:spMk id="2" creationId="{4AD106DC-1A60-44EA-9B45-87C7691BCE09}"/>
           </ac:spMkLst>
         </pc:spChg>
+        <pc:spChg chg="mod">
+          <ac:chgData name="VŨ ĐĂNG HOÀNG LONG" userId="a7f37be1-0431-4d22-a98c-6d73ca78dda1" providerId="ADAL" clId="{827A363B-7D48-4E31-8D14-C53C430A7CDA}" dt="2021-01-16T03:14:34.933" v="11045"/>
+          <ac:spMkLst>
+            <pc:docMk/>
+            <pc:sldMk cId="3068223525" sldId="275"/>
+            <ac:spMk id="3" creationId="{36B77C27-FE88-4214-8173-C40E2F3F9948}"/>
+          </ac:spMkLst>
+        </pc:spChg>
       </pc:sldChg>
-      <pc:sldChg chg="modSp add mod">
-        <pc:chgData name="VŨ ĐĂNG HOÀNG LONG" userId="a7f37be1-0431-4d22-a98c-6d73ca78dda1" providerId="ADAL" clId="{827A363B-7D48-4E31-8D14-C53C430A7CDA}" dt="2021-01-15T17:52:57.262" v="2905" actId="20577"/>
+      <pc:sldChg chg="addSp modSp add mod">
+        <pc:chgData name="VŨ ĐĂNG HOÀNG LONG" userId="a7f37be1-0431-4d22-a98c-6d73ca78dda1" providerId="ADAL" clId="{827A363B-7D48-4E31-8D14-C53C430A7CDA}" dt="2021-01-16T03:13:50.130" v="11035" actId="1076"/>
         <pc:sldMkLst>
           <pc:docMk/>
           <pc:sldMk cId="546907594" sldId="276"/>
         </pc:sldMkLst>
         <pc:spChg chg="mod">
-          <ac:chgData name="VŨ ĐĂNG HOÀNG LONG" userId="a7f37be1-0431-4d22-a98c-6d73ca78dda1" providerId="ADAL" clId="{827A363B-7D48-4E31-8D14-C53C430A7CDA}" dt="2021-01-15T17:52:57.262" v="2905" actId="20577"/>
+          <ac:chgData name="VŨ ĐĂNG HOÀNG LONG" userId="a7f37be1-0431-4d22-a98c-6d73ca78dda1" providerId="ADAL" clId="{827A363B-7D48-4E31-8D14-C53C430A7CDA}" dt="2021-01-16T01:03:14.521" v="10468" actId="20577"/>
           <ac:spMkLst>
             <pc:docMk/>
             <pc:sldMk cId="546907594" sldId="276"/>
             <ac:spMk id="2" creationId="{4AD106DC-1A60-44EA-9B45-87C7691BCE09}"/>
           </ac:spMkLst>
         </pc:spChg>
+        <pc:spChg chg="mod">
+          <ac:chgData name="VŨ ĐĂNG HOÀNG LONG" userId="a7f37be1-0431-4d22-a98c-6d73ca78dda1" providerId="ADAL" clId="{827A363B-7D48-4E31-8D14-C53C430A7CDA}" dt="2021-01-16T03:13:43.251" v="11034" actId="20577"/>
+          <ac:spMkLst>
+            <pc:docMk/>
+            <pc:sldMk cId="546907594" sldId="276"/>
+            <ac:spMk id="3" creationId="{36B77C27-FE88-4214-8173-C40E2F3F9948}"/>
+          </ac:spMkLst>
+        </pc:spChg>
+        <pc:picChg chg="add mod">
+          <ac:chgData name="VŨ ĐĂNG HOÀNG LONG" userId="a7f37be1-0431-4d22-a98c-6d73ca78dda1" providerId="ADAL" clId="{827A363B-7D48-4E31-8D14-C53C430A7CDA}" dt="2021-01-16T03:13:50.130" v="11035" actId="1076"/>
+          <ac:picMkLst>
+            <pc:docMk/>
+            <pc:sldMk cId="546907594" sldId="276"/>
+            <ac:picMk id="5" creationId="{706DF6DF-D641-4131-A3D4-67B9983D0F82}"/>
+          </ac:picMkLst>
+        </pc:picChg>
       </pc:sldChg>
       <pc:sldChg chg="new del">
         <pc:chgData name="VŨ ĐĂNG HOÀNG LONG" userId="a7f37be1-0431-4d22-a98c-6d73ca78dda1" providerId="ADAL" clId="{827A363B-7D48-4E31-8D14-C53C430A7CDA}" dt="2021-01-15T17:53:12.945" v="2908" actId="47"/>
@@ -633,13 +663,13 @@
         </pc:sldMkLst>
       </pc:sldChg>
       <pc:sldChg chg="modSp new mod">
-        <pc:chgData name="VŨ ĐĂNG HOÀNG LONG" userId="a7f37be1-0431-4d22-a98c-6d73ca78dda1" providerId="ADAL" clId="{827A363B-7D48-4E31-8D14-C53C430A7CDA}" dt="2021-01-15T17:53:58.359" v="2936" actId="20577"/>
+        <pc:chgData name="VŨ ĐĂNG HOÀNG LONG" userId="a7f37be1-0431-4d22-a98c-6d73ca78dda1" providerId="ADAL" clId="{827A363B-7D48-4E31-8D14-C53C430A7CDA}" dt="2021-01-16T03:14:11.024" v="11039"/>
         <pc:sldMkLst>
           <pc:docMk/>
           <pc:sldMk cId="3522696618" sldId="278"/>
         </pc:sldMkLst>
         <pc:spChg chg="mod">
-          <ac:chgData name="VŨ ĐĂNG HOÀNG LONG" userId="a7f37be1-0431-4d22-a98c-6d73ca78dda1" providerId="ADAL" clId="{827A363B-7D48-4E31-8D14-C53C430A7CDA}" dt="2021-01-15T17:53:58.359" v="2936" actId="20577"/>
+          <ac:chgData name="VŨ ĐĂNG HOÀNG LONG" userId="a7f37be1-0431-4d22-a98c-6d73ca78dda1" providerId="ADAL" clId="{827A363B-7D48-4E31-8D14-C53C430A7CDA}" dt="2021-01-16T03:14:11.024" v="11039"/>
           <ac:spMkLst>
             <pc:docMk/>
             <pc:sldMk cId="3522696618" sldId="278"/>
@@ -648,7 +678,7 @@
         </pc:spChg>
       </pc:sldChg>
       <pc:sldChg chg="modSp new mod">
-        <pc:chgData name="VŨ ĐĂNG HOÀNG LONG" userId="a7f37be1-0431-4d22-a98c-6d73ca78dda1" providerId="ADAL" clId="{827A363B-7D48-4E31-8D14-C53C430A7CDA}" dt="2021-01-15T17:54:08.161" v="2951" actId="122"/>
+        <pc:chgData name="VŨ ĐĂNG HOÀNG LONG" userId="a7f37be1-0431-4d22-a98c-6d73ca78dda1" providerId="ADAL" clId="{827A363B-7D48-4E31-8D14-C53C430A7CDA}" dt="2021-01-16T03:13:18.090" v="11017" actId="27636"/>
         <pc:sldMkLst>
           <pc:docMk/>
           <pc:sldMk cId="1981201201" sldId="279"/>
@@ -659,6 +689,14 @@
             <pc:docMk/>
             <pc:sldMk cId="1981201201" sldId="279"/>
             <ac:spMk id="2" creationId="{3E07D542-6E83-4235-A531-BDEAA4F39E0D}"/>
+          </ac:spMkLst>
+        </pc:spChg>
+        <pc:spChg chg="mod">
+          <ac:chgData name="VŨ ĐĂNG HOÀNG LONG" userId="a7f37be1-0431-4d22-a98c-6d73ca78dda1" providerId="ADAL" clId="{827A363B-7D48-4E31-8D14-C53C430A7CDA}" dt="2021-01-16T03:13:18.090" v="11017" actId="27636"/>
+          <ac:spMkLst>
+            <pc:docMk/>
+            <pc:sldMk cId="1981201201" sldId="279"/>
+            <ac:spMk id="3" creationId="{E64A049A-7A8E-4520-B7E0-F5FA6AE968A4}"/>
           </ac:spMkLst>
         </pc:spChg>
       </pc:sldChg>
@@ -1038,13 +1076,13 @@
         </pc:picChg>
       </pc:sldChg>
       <pc:sldChg chg="addSp modSp add mod">
-        <pc:chgData name="VŨ ĐĂNG HOÀNG LONG" userId="a7f37be1-0431-4d22-a98c-6d73ca78dda1" providerId="ADAL" clId="{827A363B-7D48-4E31-8D14-C53C430A7CDA}" dt="2021-01-15T19:28:12.306" v="8111" actId="20577"/>
+        <pc:chgData name="VŨ ĐĂNG HOÀNG LONG" userId="a7f37be1-0431-4d22-a98c-6d73ca78dda1" providerId="ADAL" clId="{827A363B-7D48-4E31-8D14-C53C430A7CDA}" dt="2021-01-16T00:50:09.113" v="9704" actId="20577"/>
         <pc:sldMkLst>
           <pc:docMk/>
           <pc:sldMk cId="1335272250" sldId="295"/>
         </pc:sldMkLst>
         <pc:spChg chg="mod">
-          <ac:chgData name="VŨ ĐĂNG HOÀNG LONG" userId="a7f37be1-0431-4d22-a98c-6d73ca78dda1" providerId="ADAL" clId="{827A363B-7D48-4E31-8D14-C53C430A7CDA}" dt="2021-01-15T19:28:12.306" v="8111" actId="20577"/>
+          <ac:chgData name="VŨ ĐĂNG HOÀNG LONG" userId="a7f37be1-0431-4d22-a98c-6d73ca78dda1" providerId="ADAL" clId="{827A363B-7D48-4E31-8D14-C53C430A7CDA}" dt="2021-01-16T00:50:09.113" v="9704" actId="20577"/>
           <ac:spMkLst>
             <pc:docMk/>
             <pc:sldMk cId="1335272250" sldId="295"/>
@@ -1075,25 +1113,48 @@
           </ac:spMkLst>
         </pc:spChg>
       </pc:sldChg>
-      <pc:sldChg chg="add">
-        <pc:chgData name="VŨ ĐĂNG HOÀNG LONG" userId="a7f37be1-0431-4d22-a98c-6d73ca78dda1" providerId="ADAL" clId="{827A363B-7D48-4E31-8D14-C53C430A7CDA}" dt="2021-01-15T19:16:01.764" v="7435"/>
+      <pc:sldChg chg="modSp add mod">
+        <pc:chgData name="VŨ ĐĂNG HOÀNG LONG" userId="a7f37be1-0431-4d22-a98c-6d73ca78dda1" providerId="ADAL" clId="{827A363B-7D48-4E31-8D14-C53C430A7CDA}" dt="2021-01-16T00:03:45.645" v="9489" actId="20577"/>
         <pc:sldMkLst>
           <pc:docMk/>
           <pc:sldMk cId="1996564421" sldId="297"/>
         </pc:sldMkLst>
+        <pc:spChg chg="mod">
+          <ac:chgData name="VŨ ĐĂNG HOÀNG LONG" userId="a7f37be1-0431-4d22-a98c-6d73ca78dda1" providerId="ADAL" clId="{827A363B-7D48-4E31-8D14-C53C430A7CDA}" dt="2021-01-16T00:03:45.645" v="9489" actId="20577"/>
+          <ac:spMkLst>
+            <pc:docMk/>
+            <pc:sldMk cId="1996564421" sldId="297"/>
+            <ac:spMk id="2" creationId="{4AD106DC-1A60-44EA-9B45-87C7691BCE09}"/>
+          </ac:spMkLst>
+        </pc:spChg>
       </pc:sldChg>
       <pc:sldChg chg="modSp add mod">
-        <pc:chgData name="VŨ ĐĂNG HOÀNG LONG" userId="a7f37be1-0431-4d22-a98c-6d73ca78dda1" providerId="ADAL" clId="{827A363B-7D48-4E31-8D14-C53C430A7CDA}" dt="2021-01-15T21:56:08.604" v="9123" actId="20577"/>
+        <pc:chgData name="VŨ ĐĂNG HOÀNG LONG" userId="a7f37be1-0431-4d22-a98c-6d73ca78dda1" providerId="ADAL" clId="{827A363B-7D48-4E31-8D14-C53C430A7CDA}" dt="2021-01-16T01:08:59.415" v="10535" actId="20577"/>
         <pc:sldMkLst>
           <pc:docMk/>
           <pc:sldMk cId="2144853111" sldId="298"/>
         </pc:sldMkLst>
         <pc:spChg chg="mod">
-          <ac:chgData name="VŨ ĐĂNG HOÀNG LONG" userId="a7f37be1-0431-4d22-a98c-6d73ca78dda1" providerId="ADAL" clId="{827A363B-7D48-4E31-8D14-C53C430A7CDA}" dt="2021-01-15T21:56:08.604" v="9123" actId="20577"/>
+          <ac:chgData name="VŨ ĐĂNG HOÀNG LONG" userId="a7f37be1-0431-4d22-a98c-6d73ca78dda1" providerId="ADAL" clId="{827A363B-7D48-4E31-8D14-C53C430A7CDA}" dt="2021-01-16T01:08:59.415" v="10535" actId="20577"/>
           <ac:spMkLst>
             <pc:docMk/>
             <pc:sldMk cId="2144853111" sldId="298"/>
             <ac:spMk id="3" creationId="{36B77C27-FE88-4214-8173-C40E2F3F9948}"/>
+          </ac:spMkLst>
+        </pc:spChg>
+      </pc:sldChg>
+      <pc:sldChg chg="modSp add mod">
+        <pc:chgData name="VŨ ĐĂNG HOÀNG LONG" userId="a7f37be1-0431-4d22-a98c-6d73ca78dda1" providerId="ADAL" clId="{827A363B-7D48-4E31-8D14-C53C430A7CDA}" dt="2021-01-16T00:03:57.228" v="9512" actId="20577"/>
+        <pc:sldMkLst>
+          <pc:docMk/>
+          <pc:sldMk cId="2111348987" sldId="299"/>
+        </pc:sldMkLst>
+        <pc:spChg chg="mod">
+          <ac:chgData name="VŨ ĐĂNG HOÀNG LONG" userId="a7f37be1-0431-4d22-a98c-6d73ca78dda1" providerId="ADAL" clId="{827A363B-7D48-4E31-8D14-C53C430A7CDA}" dt="2021-01-16T00:03:57.228" v="9512" actId="20577"/>
+          <ac:spMkLst>
+            <pc:docMk/>
+            <pc:sldMk cId="2111348987" sldId="299"/>
+            <ac:spMk id="2" creationId="{4AD106DC-1A60-44EA-9B45-87C7691BCE09}"/>
           </ac:spMkLst>
         </pc:spChg>
       </pc:sldChg>
@@ -1103,6 +1164,104 @@
           <pc:docMk/>
           <pc:sldMk cId="2128853475" sldId="299"/>
         </pc:sldMkLst>
+      </pc:sldChg>
+      <pc:sldChg chg="modSp add mod">
+        <pc:chgData name="VŨ ĐĂNG HOÀNG LONG" userId="a7f37be1-0431-4d22-a98c-6d73ca78dda1" providerId="ADAL" clId="{827A363B-7D48-4E31-8D14-C53C430A7CDA}" dt="2021-01-16T00:04:09.482" v="9543" actId="20577"/>
+        <pc:sldMkLst>
+          <pc:docMk/>
+          <pc:sldMk cId="3923264112" sldId="300"/>
+        </pc:sldMkLst>
+        <pc:spChg chg="mod">
+          <ac:chgData name="VŨ ĐĂNG HOÀNG LONG" userId="a7f37be1-0431-4d22-a98c-6d73ca78dda1" providerId="ADAL" clId="{827A363B-7D48-4E31-8D14-C53C430A7CDA}" dt="2021-01-16T00:04:09.482" v="9543" actId="20577"/>
+          <ac:spMkLst>
+            <pc:docMk/>
+            <pc:sldMk cId="3923264112" sldId="300"/>
+            <ac:spMk id="2" creationId="{4AD106DC-1A60-44EA-9B45-87C7691BCE09}"/>
+          </ac:spMkLst>
+        </pc:spChg>
+      </pc:sldChg>
+      <pc:sldChg chg="modSp add mod">
+        <pc:chgData name="VŨ ĐĂNG HOÀNG LONG" userId="a7f37be1-0431-4d22-a98c-6d73ca78dda1" providerId="ADAL" clId="{827A363B-7D48-4E31-8D14-C53C430A7CDA}" dt="2021-01-16T00:04:28.342" v="9563" actId="20577"/>
+        <pc:sldMkLst>
+          <pc:docMk/>
+          <pc:sldMk cId="2051104062" sldId="301"/>
+        </pc:sldMkLst>
+        <pc:spChg chg="mod">
+          <ac:chgData name="VŨ ĐĂNG HOÀNG LONG" userId="a7f37be1-0431-4d22-a98c-6d73ca78dda1" providerId="ADAL" clId="{827A363B-7D48-4E31-8D14-C53C430A7CDA}" dt="2021-01-16T00:04:28.342" v="9563" actId="20577"/>
+          <ac:spMkLst>
+            <pc:docMk/>
+            <pc:sldMk cId="2051104062" sldId="301"/>
+            <ac:spMk id="2" creationId="{4AD106DC-1A60-44EA-9B45-87C7691BCE09}"/>
+          </ac:spMkLst>
+        </pc:spChg>
+      </pc:sldChg>
+      <pc:sldChg chg="modSp add mod">
+        <pc:chgData name="VŨ ĐĂNG HOÀNG LONG" userId="a7f37be1-0431-4d22-a98c-6d73ca78dda1" providerId="ADAL" clId="{827A363B-7D48-4E31-8D14-C53C430A7CDA}" dt="2021-01-16T00:04:34.923" v="9565" actId="20577"/>
+        <pc:sldMkLst>
+          <pc:docMk/>
+          <pc:sldMk cId="2187135573" sldId="302"/>
+        </pc:sldMkLst>
+        <pc:spChg chg="mod">
+          <ac:chgData name="VŨ ĐĂNG HOÀNG LONG" userId="a7f37be1-0431-4d22-a98c-6d73ca78dda1" providerId="ADAL" clId="{827A363B-7D48-4E31-8D14-C53C430A7CDA}" dt="2021-01-16T00:04:34.923" v="9565" actId="20577"/>
+          <ac:spMkLst>
+            <pc:docMk/>
+            <pc:sldMk cId="2187135573" sldId="302"/>
+            <ac:spMk id="2" creationId="{4AD106DC-1A60-44EA-9B45-87C7691BCE09}"/>
+          </ac:spMkLst>
+        </pc:spChg>
+      </pc:sldChg>
+      <pc:sldChg chg="modSp add mod">
+        <pc:chgData name="VŨ ĐĂNG HOÀNG LONG" userId="a7f37be1-0431-4d22-a98c-6d73ca78dda1" providerId="ADAL" clId="{827A363B-7D48-4E31-8D14-C53C430A7CDA}" dt="2021-01-16T03:14:26.216" v="11042"/>
+        <pc:sldMkLst>
+          <pc:docMk/>
+          <pc:sldMk cId="2622201153" sldId="303"/>
+        </pc:sldMkLst>
+        <pc:spChg chg="mod">
+          <ac:chgData name="VŨ ĐĂNG HOÀNG LONG" userId="a7f37be1-0431-4d22-a98c-6d73ca78dda1" providerId="ADAL" clId="{827A363B-7D48-4E31-8D14-C53C430A7CDA}" dt="2021-01-16T01:03:05.644" v="10426" actId="20577"/>
+          <ac:spMkLst>
+            <pc:docMk/>
+            <pc:sldMk cId="2622201153" sldId="303"/>
+            <ac:spMk id="2" creationId="{4AD106DC-1A60-44EA-9B45-87C7691BCE09}"/>
+          </ac:spMkLst>
+        </pc:spChg>
+        <pc:spChg chg="mod">
+          <ac:chgData name="VŨ ĐĂNG HOÀNG LONG" userId="a7f37be1-0431-4d22-a98c-6d73ca78dda1" providerId="ADAL" clId="{827A363B-7D48-4E31-8D14-C53C430A7CDA}" dt="2021-01-16T03:14:26.216" v="11042"/>
+          <ac:spMkLst>
+            <pc:docMk/>
+            <pc:sldMk cId="2622201153" sldId="303"/>
+            <ac:spMk id="3" creationId="{36B77C27-FE88-4214-8173-C40E2F3F9948}"/>
+          </ac:spMkLst>
+        </pc:spChg>
+      </pc:sldChg>
+      <pc:sldChg chg="new del">
+        <pc:chgData name="VŨ ĐĂNG HOÀNG LONG" userId="a7f37be1-0431-4d22-a98c-6d73ca78dda1" providerId="ADAL" clId="{827A363B-7D48-4E31-8D14-C53C430A7CDA}" dt="2021-01-16T00:59:36.142" v="10120" actId="680"/>
+        <pc:sldMkLst>
+          <pc:docMk/>
+          <pc:sldMk cId="3002105831" sldId="304"/>
+        </pc:sldMkLst>
+      </pc:sldChg>
+      <pc:sldChg chg="modSp add mod ord">
+        <pc:chgData name="VŨ ĐĂNG HOÀNG LONG" userId="a7f37be1-0431-4d22-a98c-6d73ca78dda1" providerId="ADAL" clId="{827A363B-7D48-4E31-8D14-C53C430A7CDA}" dt="2021-01-16T01:04:35.720" v="10513" actId="20577"/>
+        <pc:sldMkLst>
+          <pc:docMk/>
+          <pc:sldMk cId="3473368064" sldId="304"/>
+        </pc:sldMkLst>
+        <pc:spChg chg="mod">
+          <ac:chgData name="VŨ ĐĂNG HOÀNG LONG" userId="a7f37be1-0431-4d22-a98c-6d73ca78dda1" providerId="ADAL" clId="{827A363B-7D48-4E31-8D14-C53C430A7CDA}" dt="2021-01-16T00:59:44.101" v="10138" actId="20577"/>
+          <ac:spMkLst>
+            <pc:docMk/>
+            <pc:sldMk cId="3473368064" sldId="304"/>
+            <ac:spMk id="2" creationId="{4AD106DC-1A60-44EA-9B45-87C7691BCE09}"/>
+          </ac:spMkLst>
+        </pc:spChg>
+        <pc:spChg chg="mod">
+          <ac:chgData name="VŨ ĐĂNG HOÀNG LONG" userId="a7f37be1-0431-4d22-a98c-6d73ca78dda1" providerId="ADAL" clId="{827A363B-7D48-4E31-8D14-C53C430A7CDA}" dt="2021-01-16T01:04:35.720" v="10513" actId="20577"/>
+          <ac:spMkLst>
+            <pc:docMk/>
+            <pc:sldMk cId="3473368064" sldId="304"/>
+            <ac:spMk id="3" creationId="{36B77C27-FE88-4214-8173-C40E2F3F9948}"/>
+          </ac:spMkLst>
+        </pc:spChg>
       </pc:sldChg>
       <pc:sldMasterChg chg="modSp modSldLayout">
         <pc:chgData name="VŨ ĐĂNG HOÀNG LONG" userId="a7f37be1-0431-4d22-a98c-6d73ca78dda1" providerId="ADAL" clId="{827A363B-7D48-4E31-8D14-C53C430A7CDA}" dt="2021-01-15T17:03:19.593" v="25" actId="2711"/>
@@ -11593,7 +11752,39 @@
             </a:r>
             <a:r>
               <a:rPr lang="en-US" dirty="0"/>
-              <a:t> SVD </a:t>
+              <a:t> </a:t>
+            </a:r>
+            <a:r>
+              <a:rPr lang="en-US" dirty="0" err="1"/>
+              <a:t>phương</a:t>
+            </a:r>
+            <a:r>
+              <a:rPr lang="en-US" dirty="0"/>
+              <a:t> </a:t>
+            </a:r>
+            <a:r>
+              <a:rPr lang="en-US" dirty="0" err="1"/>
+              <a:t>pháp</a:t>
+            </a:r>
+            <a:r>
+              <a:rPr lang="en-US" dirty="0"/>
+              <a:t> Chi </a:t>
+            </a:r>
+            <a:r>
+              <a:rPr lang="en-US" dirty="0" err="1"/>
+              <a:t>bình</a:t>
+            </a:r>
+            <a:r>
+              <a:rPr lang="en-US" dirty="0"/>
+              <a:t> </a:t>
+            </a:r>
+            <a:r>
+              <a:rPr lang="en-US" dirty="0" err="1"/>
+              <a:t>phương</a:t>
+            </a:r>
+            <a:r>
+              <a:rPr lang="en-US" dirty="0"/>
+              <a:t> </a:t>
             </a:r>
             <a:r>
               <a:rPr lang="en-US" dirty="0" err="1"/>
@@ -11605,59 +11796,43 @@
             </a:r>
             <a:r>
               <a:rPr lang="en-US" dirty="0" err="1"/>
-              <a:t>giảm</a:t>
-            </a:r>
-            <a:r>
-              <a:rPr lang="en-US" dirty="0"/>
-              <a:t> </a:t>
-            </a:r>
-            <a:r>
-              <a:rPr lang="en-US" dirty="0" err="1"/>
-              <a:t>chiều</a:t>
-            </a:r>
-            <a:r>
-              <a:rPr lang="en-US" dirty="0"/>
-              <a:t> vector (</a:t>
-            </a:r>
-            <a:r>
-              <a:rPr lang="en-US" dirty="0" err="1"/>
-              <a:t>tương</a:t>
-            </a:r>
-            <a:r>
-              <a:rPr lang="en-US" dirty="0"/>
-              <a:t> </a:t>
-            </a:r>
-            <a:r>
-              <a:rPr lang="en-US" dirty="0" err="1"/>
-              <a:t>tự</a:t>
-            </a:r>
-            <a:r>
-              <a:rPr lang="en-US" dirty="0"/>
-              <a:t> PCA </a:t>
-            </a:r>
-            <a:r>
-              <a:rPr lang="en-US" dirty="0" err="1"/>
-              <a:t>nhưng</a:t>
-            </a:r>
-            <a:r>
-              <a:rPr lang="en-US" dirty="0"/>
-              <a:t> </a:t>
-            </a:r>
-            <a:r>
-              <a:rPr lang="en-US" dirty="0" err="1"/>
-              <a:t>tốt</a:t>
-            </a:r>
-            <a:r>
-              <a:rPr lang="en-US" dirty="0"/>
-              <a:t> </a:t>
-            </a:r>
-            <a:r>
-              <a:rPr lang="en-US" dirty="0" err="1"/>
-              <a:t>hơn</a:t>
-            </a:r>
-            <a:r>
-              <a:rPr lang="en-US" dirty="0"/>
-              <a:t>)</a:t>
+              <a:t>rút</a:t>
+            </a:r>
+            <a:r>
+              <a:rPr lang="en-US" dirty="0"/>
+              <a:t> </a:t>
+            </a:r>
+            <a:r>
+              <a:rPr lang="en-US" dirty="0" err="1"/>
+              <a:t>gọn</a:t>
+            </a:r>
+            <a:r>
+              <a:rPr lang="en-US" dirty="0"/>
+              <a:t> </a:t>
+            </a:r>
+            <a:r>
+              <a:rPr lang="en-US" dirty="0" err="1"/>
+              <a:t>đặc</a:t>
+            </a:r>
+            <a:r>
+              <a:rPr lang="en-US" dirty="0"/>
+              <a:t> </a:t>
+            </a:r>
+            <a:r>
+              <a:rPr lang="en-US" dirty="0" err="1"/>
+              <a:t>trưng</a:t>
+            </a:r>
+            <a:r>
+              <a:rPr lang="en-US" dirty="0"/>
+              <a:t> </a:t>
+            </a:r>
+            <a:r>
+              <a:rPr lang="en-US" dirty="0" err="1"/>
+              <a:t>của</a:t>
+            </a:r>
+            <a:r>
+              <a:rPr lang="en-US" dirty="0"/>
+              <a:t> vector TF-IDF.</a:t>
             </a:r>
           </a:p>
         </p:txBody>
@@ -12144,6 +12319,30 @@
             </a:r>
             <a:r>
               <a:rPr lang="en-US" dirty="0"/>
+              <a:t> </a:t>
+            </a:r>
+            <a:r>
+              <a:rPr lang="en-US" dirty="0" err="1"/>
+              <a:t>trên</a:t>
+            </a:r>
+            <a:r>
+              <a:rPr lang="en-US" dirty="0"/>
+              <a:t> 5% </a:t>
+            </a:r>
+            <a:r>
+              <a:rPr lang="en-US" dirty="0" err="1"/>
+              <a:t>dữ</a:t>
+            </a:r>
+            <a:r>
+              <a:rPr lang="en-US" dirty="0"/>
+              <a:t> </a:t>
+            </a:r>
+            <a:r>
+              <a:rPr lang="en-US" dirty="0" err="1"/>
+              <a:t>liệu</a:t>
+            </a:r>
+            <a:r>
+              <a:rPr lang="en-US" dirty="0"/>
               <a:t>:</a:t>
             </a:r>
           </a:p>
@@ -12155,50 +12354,86 @@
           </a:p>
           <a:p>
             <a:r>
-              <a:rPr lang="en-US" dirty="0" err="1"/>
-              <a:t>Softmax</a:t>
-            </a:r>
-            <a:r>
-              <a:rPr lang="en-US" dirty="0"/>
-              <a:t> Regression</a:t>
-            </a:r>
-          </a:p>
-          <a:p>
-            <a:r>
-              <a:rPr lang="en-US" dirty="0" err="1"/>
-              <a:t>Softmax</a:t>
-            </a:r>
-            <a:r>
-              <a:rPr lang="en-US" dirty="0"/>
-              <a:t> Regression có </a:t>
-            </a:r>
-            <a:r>
-              <a:rPr lang="en-US" dirty="0" err="1"/>
-              <a:t>sử</a:t>
-            </a:r>
-            <a:r>
-              <a:rPr lang="en-US" dirty="0"/>
-              <a:t> </a:t>
-            </a:r>
-            <a:r>
-              <a:rPr lang="en-US" dirty="0" err="1"/>
-              <a:t>dụng</a:t>
-            </a:r>
-            <a:r>
-              <a:rPr lang="en-US" dirty="0"/>
-              <a:t> </a:t>
-            </a:r>
-            <a:r>
-              <a:rPr lang="en-US" dirty="0" err="1"/>
-              <a:t>phương</a:t>
-            </a:r>
-            <a:r>
-              <a:rPr lang="en-US" dirty="0"/>
-              <a:t> </a:t>
-            </a:r>
-            <a:r>
-              <a:rPr lang="en-US" dirty="0" err="1"/>
-              <a:t>pháp</a:t>
+              <a:rPr lang="en-US" dirty="0"/>
+              <a:t>Logistic Regression</a:t>
+            </a:r>
+          </a:p>
+          <a:p>
+            <a:r>
+              <a:rPr lang="en-US" dirty="0"/>
+              <a:t>Logistic Regression </a:t>
+            </a:r>
+            <a:r>
+              <a:rPr lang="en-US" dirty="0" err="1"/>
+              <a:t>dùng</a:t>
+            </a:r>
+            <a:r>
+              <a:rPr lang="en-US" dirty="0"/>
+              <a:t> </a:t>
+            </a:r>
+            <a:r>
+              <a:rPr lang="en-US" dirty="0" err="1"/>
+              <a:t>với</a:t>
+            </a:r>
+            <a:r>
+              <a:rPr lang="en-US" dirty="0"/>
+              <a:t> </a:t>
+            </a:r>
+            <a:r>
+              <a:rPr lang="en-US" dirty="0" err="1"/>
+              <a:t>kỹ</a:t>
+            </a:r>
+            <a:r>
+              <a:rPr lang="en-US" dirty="0"/>
+              <a:t> </a:t>
+            </a:r>
+            <a:r>
+              <a:rPr lang="en-US" dirty="0" err="1"/>
+              <a:t>thuật</a:t>
+            </a:r>
+            <a:r>
+              <a:rPr lang="en-US" dirty="0"/>
+              <a:t> bagging</a:t>
+            </a:r>
+          </a:p>
+          <a:p>
+            <a:r>
+              <a:rPr lang="en-US" dirty="0"/>
+              <a:t>Neuron Network</a:t>
+            </a:r>
+          </a:p>
+          <a:p>
+            <a:r>
+              <a:rPr lang="en-US" dirty="0"/>
+              <a:t>Neuron Network </a:t>
+            </a:r>
+            <a:r>
+              <a:rPr lang="en-US" dirty="0" err="1"/>
+              <a:t>dùng</a:t>
+            </a:r>
+            <a:r>
+              <a:rPr lang="en-US" dirty="0"/>
+              <a:t> </a:t>
+            </a:r>
+            <a:r>
+              <a:rPr lang="en-US" dirty="0" err="1"/>
+              <a:t>với</a:t>
+            </a:r>
+            <a:r>
+              <a:rPr lang="en-US" dirty="0"/>
+              <a:t> </a:t>
+            </a:r>
+            <a:r>
+              <a:rPr lang="en-US" dirty="0" err="1"/>
+              <a:t>kỹ</a:t>
+            </a:r>
+            <a:r>
+              <a:rPr lang="en-US" dirty="0"/>
+              <a:t> </a:t>
+            </a:r>
+            <a:r>
+              <a:rPr lang="en-US" dirty="0" err="1"/>
+              <a:t>thuật</a:t>
             </a:r>
             <a:r>
               <a:rPr lang="en-US" dirty="0"/>
@@ -12384,56 +12619,8 @@
           <a:p>
             <a:pPr algn="ctr"/>
             <a:r>
-              <a:rPr lang="en-US" dirty="0" err="1"/>
-              <a:t>Xây</a:t>
-            </a:r>
-            <a:r>
-              <a:rPr lang="en-US" dirty="0"/>
-              <a:t> </a:t>
-            </a:r>
-            <a:r>
-              <a:rPr lang="en-US" dirty="0" err="1"/>
-              <a:t>dựng</a:t>
-            </a:r>
-            <a:r>
-              <a:rPr lang="en-US" dirty="0"/>
-              <a:t> </a:t>
-            </a:r>
-            <a:r>
-              <a:rPr lang="en-US" dirty="0" err="1"/>
-              <a:t>mô</a:t>
-            </a:r>
-            <a:r>
-              <a:rPr lang="en-US" dirty="0"/>
-              <a:t> </a:t>
-            </a:r>
-            <a:r>
-              <a:rPr lang="en-US" dirty="0" err="1"/>
-              <a:t>hình</a:t>
-            </a:r>
-            <a:r>
-              <a:rPr lang="en-US" dirty="0"/>
-              <a:t> </a:t>
-            </a:r>
-            <a:r>
-              <a:rPr lang="en-US" dirty="0" err="1"/>
-              <a:t>và</a:t>
-            </a:r>
-            <a:r>
-              <a:rPr lang="en-US" dirty="0"/>
-              <a:t> </a:t>
-            </a:r>
-            <a:r>
-              <a:rPr lang="en-US" dirty="0" err="1"/>
-              <a:t>thử</a:t>
-            </a:r>
-            <a:r>
-              <a:rPr lang="en-US" dirty="0"/>
-              <a:t> </a:t>
-            </a:r>
-            <a:r>
-              <a:rPr lang="en-US" dirty="0" err="1"/>
-              <a:t>nghiệm</a:t>
+              <a:rPr lang="en-US" dirty="0"/>
+              <a:t>Naive Bayes (5% data)</a:t>
             </a:r>
             <a:endParaRPr lang="vi-VN" dirty="0"/>
           </a:p>
@@ -12517,56 +12704,8 @@
           <a:p>
             <a:pPr algn="ctr"/>
             <a:r>
-              <a:rPr lang="en-US" dirty="0" err="1"/>
-              <a:t>Xây</a:t>
-            </a:r>
-            <a:r>
-              <a:rPr lang="en-US" dirty="0"/>
-              <a:t> </a:t>
-            </a:r>
-            <a:r>
-              <a:rPr lang="en-US" dirty="0" err="1"/>
-              <a:t>dựng</a:t>
-            </a:r>
-            <a:r>
-              <a:rPr lang="en-US" dirty="0"/>
-              <a:t> </a:t>
-            </a:r>
-            <a:r>
-              <a:rPr lang="en-US" dirty="0" err="1"/>
-              <a:t>mô</a:t>
-            </a:r>
-            <a:r>
-              <a:rPr lang="en-US" dirty="0"/>
-              <a:t> </a:t>
-            </a:r>
-            <a:r>
-              <a:rPr lang="en-US" dirty="0" err="1"/>
-              <a:t>hình</a:t>
-            </a:r>
-            <a:r>
-              <a:rPr lang="en-US" dirty="0"/>
-              <a:t> </a:t>
-            </a:r>
-            <a:r>
-              <a:rPr lang="en-US" dirty="0" err="1"/>
-              <a:t>và</a:t>
-            </a:r>
-            <a:r>
-              <a:rPr lang="en-US" dirty="0"/>
-              <a:t> </a:t>
-            </a:r>
-            <a:r>
-              <a:rPr lang="en-US" dirty="0" err="1"/>
-              <a:t>thử</a:t>
-            </a:r>
-            <a:r>
-              <a:rPr lang="en-US" dirty="0"/>
-              <a:t> </a:t>
-            </a:r>
-            <a:r>
-              <a:rPr lang="en-US" dirty="0" err="1"/>
-              <a:t>nghiệm</a:t>
+              <a:rPr lang="en-US" dirty="0"/>
+              <a:t>Logistic Regression (5% data)</a:t>
             </a:r>
             <a:endParaRPr lang="vi-VN" dirty="0"/>
           </a:p>
@@ -12593,129 +12732,14 @@
           <a:bodyPr/>
           <a:lstStyle/>
           <a:p>
-            <a:r>
-              <a:rPr lang="en-US" dirty="0"/>
-              <a:t>Do </a:t>
-            </a:r>
-            <a:r>
-              <a:rPr lang="en-US" dirty="0" err="1"/>
-              <a:t>khối</a:t>
-            </a:r>
-            <a:r>
-              <a:rPr lang="en-US" dirty="0"/>
-              <a:t> </a:t>
-            </a:r>
-            <a:r>
-              <a:rPr lang="en-US" dirty="0" err="1"/>
-              <a:t>lượng</a:t>
-            </a:r>
-            <a:r>
-              <a:rPr lang="en-US" dirty="0"/>
-              <a:t> </a:t>
-            </a:r>
-            <a:r>
-              <a:rPr lang="en-US" dirty="0" err="1"/>
-              <a:t>dữ</a:t>
-            </a:r>
-            <a:r>
-              <a:rPr lang="en-US" dirty="0"/>
-              <a:t> </a:t>
-            </a:r>
-            <a:r>
-              <a:rPr lang="en-US" dirty="0" err="1"/>
-              <a:t>liệu</a:t>
-            </a:r>
-            <a:r>
-              <a:rPr lang="en-US" dirty="0"/>
-              <a:t> </a:t>
-            </a:r>
-            <a:r>
-              <a:rPr lang="en-US" dirty="0" err="1"/>
-              <a:t>lớn</a:t>
-            </a:r>
-            <a:r>
-              <a:rPr lang="en-US" dirty="0"/>
-              <a:t>, </a:t>
-            </a:r>
-            <a:r>
-              <a:rPr lang="en-US" dirty="0" err="1"/>
-              <a:t>không</a:t>
-            </a:r>
-            <a:r>
-              <a:rPr lang="en-US" dirty="0"/>
-              <a:t> </a:t>
-            </a:r>
-            <a:r>
-              <a:rPr lang="en-US" dirty="0" err="1"/>
-              <a:t>thể</a:t>
-            </a:r>
-            <a:r>
-              <a:rPr lang="en-US" dirty="0"/>
-              <a:t> </a:t>
-            </a:r>
-            <a:r>
-              <a:rPr lang="en-US" dirty="0" err="1"/>
-              <a:t>chạy</a:t>
-            </a:r>
-            <a:r>
-              <a:rPr lang="en-US" dirty="0"/>
-              <a:t> </a:t>
-            </a:r>
-            <a:r>
-              <a:rPr lang="en-US" dirty="0" err="1"/>
-              <a:t>được</a:t>
-            </a:r>
-            <a:r>
-              <a:rPr lang="en-US" dirty="0"/>
-              <a:t> </a:t>
-            </a:r>
-            <a:r>
-              <a:rPr lang="en-US" dirty="0" err="1"/>
-              <a:t>các</a:t>
-            </a:r>
-            <a:r>
-              <a:rPr lang="en-US" dirty="0"/>
-              <a:t> </a:t>
-            </a:r>
-            <a:r>
-              <a:rPr lang="en-US" dirty="0" err="1"/>
-              <a:t>mô</a:t>
-            </a:r>
-            <a:r>
-              <a:rPr lang="en-US" dirty="0"/>
-              <a:t> </a:t>
-            </a:r>
-            <a:r>
-              <a:rPr lang="en-US" dirty="0" err="1"/>
-              <a:t>hình</a:t>
-            </a:r>
-            <a:r>
-              <a:rPr lang="en-US" dirty="0"/>
-              <a:t> </a:t>
-            </a:r>
-            <a:r>
-              <a:rPr lang="en-US" dirty="0" err="1"/>
-              <a:t>học</a:t>
-            </a:r>
-            <a:r>
-              <a:rPr lang="en-US" dirty="0"/>
-              <a:t> </a:t>
-            </a:r>
-            <a:r>
-              <a:rPr lang="en-US" dirty="0" err="1"/>
-              <a:t>như</a:t>
-            </a:r>
-            <a:r>
-              <a:rPr lang="en-US" dirty="0"/>
-              <a:t> SVM, Neuron Network,...</a:t>
-            </a:r>
+            <a:endParaRPr lang="en-US" dirty="0"/>
           </a:p>
         </p:txBody>
       </p:sp>
     </p:spTree>
     <p:extLst>
       <p:ext uri="{BB962C8B-B14F-4D97-AF65-F5344CB8AC3E}">
-        <p14:creationId xmlns:p14="http://schemas.microsoft.com/office/powerpoint/2010/main" val="2144853111"/>
+        <p14:creationId xmlns:p14="http://schemas.microsoft.com/office/powerpoint/2010/main" val="2111348987"/>
       </p:ext>
     </p:extLst>
   </p:cSld>
@@ -12747,7 +12771,7 @@
           <p:cNvPr id="2" name="Title 1">
             <a:extLst>
               <a:ext uri="{FF2B5EF4-FFF2-40B4-BE49-F238E27FC236}">
-                <a16:creationId xmlns:a16="http://schemas.microsoft.com/office/drawing/2014/main" id="{07A80883-2B13-4A49-B552-25325EC20374}"/>
+                <a16:creationId xmlns:a16="http://schemas.microsoft.com/office/drawing/2014/main" id="{4AD106DC-1A60-44EA-9B45-87C7691BCE09}"/>
               </a:ext>
             </a:extLst>
           </p:cNvPr>
@@ -12763,17 +12787,17 @@
           <a:bodyPr/>
           <a:lstStyle/>
           <a:p>
-            <a:r>
-              <a:rPr lang="en-US" dirty="0" err="1"/>
-              <a:t>Tổng</a:t>
-            </a:r>
-            <a:r>
-              <a:rPr lang="en-US" dirty="0"/>
-              <a:t> </a:t>
-            </a:r>
-            <a:r>
-              <a:rPr lang="en-US" dirty="0" err="1"/>
-              <a:t>kết</a:t>
+            <a:pPr algn="ctr"/>
+            <a:r>
+              <a:rPr lang="en-US" dirty="0"/>
+              <a:t>Bagging Logistic Regression</a:t>
+            </a:r>
+            <a:br>
+              <a:rPr lang="en-US" dirty="0"/>
+            </a:br>
+            <a:r>
+              <a:rPr lang="en-US" dirty="0"/>
+              <a:t>(5% data)</a:t>
             </a:r>
             <a:endParaRPr lang="vi-VN" dirty="0"/>
           </a:p>
@@ -12781,10 +12805,10 @@
       </p:sp>
       <p:sp>
         <p:nvSpPr>
-          <p:cNvPr id="3" name="Text Placeholder 2">
+          <p:cNvPr id="3" name="Content Placeholder 2">
             <a:extLst>
               <a:ext uri="{FF2B5EF4-FFF2-40B4-BE49-F238E27FC236}">
-                <a16:creationId xmlns:a16="http://schemas.microsoft.com/office/drawing/2014/main" id="{CE18A342-537F-4A53-AD53-14D01F922E4F}"/>
+                <a16:creationId xmlns:a16="http://schemas.microsoft.com/office/drawing/2014/main" id="{36B77C27-FE88-4214-8173-C40E2F3F9948}"/>
               </a:ext>
             </a:extLst>
           </p:cNvPr>
@@ -12792,7 +12816,7 @@
             <a:spLocks noGrp="1"/>
           </p:cNvSpPr>
           <p:nvPr>
-            <p:ph type="body" idx="1"/>
+            <p:ph idx="1"/>
           </p:nvPr>
         </p:nvSpPr>
         <p:spPr/>
@@ -12800,14 +12824,14 @@
           <a:bodyPr/>
           <a:lstStyle/>
           <a:p>
-            <a:endParaRPr lang="vi-VN"/>
+            <a:endParaRPr lang="en-US" dirty="0"/>
           </a:p>
         </p:txBody>
       </p:sp>
     </p:spTree>
     <p:extLst>
       <p:ext uri="{BB962C8B-B14F-4D97-AF65-F5344CB8AC3E}">
-        <p14:creationId xmlns:p14="http://schemas.microsoft.com/office/powerpoint/2010/main" val="334925204"/>
+        <p14:creationId xmlns:p14="http://schemas.microsoft.com/office/powerpoint/2010/main" val="3923264112"/>
       </p:ext>
     </p:extLst>
   </p:cSld>
@@ -12857,16 +12881,8 @@
           <a:p>
             <a:pPr algn="ctr"/>
             <a:r>
-              <a:rPr lang="en-US" dirty="0" err="1"/>
-              <a:t>Đánh</a:t>
-            </a:r>
-            <a:r>
-              <a:rPr lang="en-US" dirty="0"/>
-              <a:t> </a:t>
-            </a:r>
-            <a:r>
-              <a:rPr lang="en-US" dirty="0" err="1"/>
-              <a:t>giá</a:t>
+              <a:rPr lang="en-US" dirty="0"/>
+              <a:t>Neuron Network (5% data)</a:t>
             </a:r>
             <a:endParaRPr lang="vi-VN" dirty="0"/>
           </a:p>
@@ -12900,7 +12916,7 @@
     </p:spTree>
     <p:extLst>
       <p:ext uri="{BB962C8B-B14F-4D97-AF65-F5344CB8AC3E}">
-        <p14:creationId xmlns:p14="http://schemas.microsoft.com/office/powerpoint/2010/main" val="3068223525"/>
+        <p14:creationId xmlns:p14="http://schemas.microsoft.com/office/powerpoint/2010/main" val="2051104062"/>
       </p:ext>
     </p:extLst>
   </p:cSld>
@@ -12950,40 +12966,15 @@
           <a:p>
             <a:pPr algn="ctr"/>
             <a:r>
-              <a:rPr lang="en-US" dirty="0" err="1"/>
-              <a:t>Chiêm</a:t>
-            </a:r>
-            <a:r>
-              <a:rPr lang="en-US" dirty="0"/>
-              <a:t> </a:t>
-            </a:r>
-            <a:r>
-              <a:rPr lang="en-US" dirty="0" err="1"/>
-              <a:t>nghiệm</a:t>
-            </a:r>
-            <a:r>
-              <a:rPr lang="en-US" dirty="0"/>
-              <a:t> </a:t>
-            </a:r>
-            <a:r>
-              <a:rPr lang="en-US" dirty="0" err="1"/>
-              <a:t>và</a:t>
-            </a:r>
-            <a:r>
-              <a:rPr lang="en-US" dirty="0"/>
-              <a:t> </a:t>
-            </a:r>
-            <a:r>
-              <a:rPr lang="en-US" dirty="0" err="1"/>
-              <a:t>tương</a:t>
-            </a:r>
-            <a:r>
-              <a:rPr lang="en-US" dirty="0"/>
-              <a:t> </a:t>
-            </a:r>
-            <a:r>
-              <a:rPr lang="en-US" dirty="0" err="1"/>
-              <a:t>lai</a:t>
+              <a:rPr lang="en-US" dirty="0"/>
+              <a:t>Bagging Neuron Network</a:t>
+            </a:r>
+            <a:br>
+              <a:rPr lang="en-US" dirty="0"/>
+            </a:br>
+            <a:r>
+              <a:rPr lang="en-US" dirty="0"/>
+              <a:t>(5% data)</a:t>
             </a:r>
             <a:endParaRPr lang="vi-VN" dirty="0"/>
           </a:p>
@@ -13017,7 +13008,7 @@
     </p:spTree>
     <p:extLst>
       <p:ext uri="{BB962C8B-B14F-4D97-AF65-F5344CB8AC3E}">
-        <p14:creationId xmlns:p14="http://schemas.microsoft.com/office/powerpoint/2010/main" val="546907594"/>
+        <p14:creationId xmlns:p14="http://schemas.microsoft.com/office/powerpoint/2010/main" val="2187135573"/>
       </p:ext>
     </p:extLst>
   </p:cSld>
@@ -13049,7 +13040,7 @@
           <p:cNvPr id="2" name="Title 1">
             <a:extLst>
               <a:ext uri="{FF2B5EF4-FFF2-40B4-BE49-F238E27FC236}">
-                <a16:creationId xmlns:a16="http://schemas.microsoft.com/office/drawing/2014/main" id="{EF7B82BC-B167-464E-96FE-8AEC25F026BE}"/>
+                <a16:creationId xmlns:a16="http://schemas.microsoft.com/office/drawing/2014/main" id="{4AD106DC-1A60-44EA-9B45-87C7691BCE09}"/>
               </a:ext>
             </a:extLst>
           </p:cNvPr>
@@ -13057,7 +13048,7 @@
             <a:spLocks noGrp="1"/>
           </p:cNvSpPr>
           <p:nvPr>
-            <p:ph type="ctrTitle"/>
+            <p:ph type="title"/>
           </p:nvPr>
         </p:nvSpPr>
         <p:spPr/>
@@ -13065,17 +13056,58 @@
           <a:bodyPr/>
           <a:lstStyle/>
           <a:p>
-            <a:r>
-              <a:rPr lang="en-US" dirty="0" err="1"/>
-              <a:t>Kết</a:t>
-            </a:r>
-            <a:r>
-              <a:rPr lang="en-US" dirty="0"/>
-              <a:t> </a:t>
-            </a:r>
-            <a:r>
-              <a:rPr lang="en-US" dirty="0" err="1"/>
-              <a:t>thúc</a:t>
+            <a:pPr algn="ctr"/>
+            <a:r>
+              <a:rPr lang="en-US" dirty="0" err="1"/>
+              <a:t>Xây</a:t>
+            </a:r>
+            <a:r>
+              <a:rPr lang="en-US" dirty="0"/>
+              <a:t> </a:t>
+            </a:r>
+            <a:r>
+              <a:rPr lang="en-US" dirty="0" err="1"/>
+              <a:t>dựng</a:t>
+            </a:r>
+            <a:r>
+              <a:rPr lang="en-US" dirty="0"/>
+              <a:t> </a:t>
+            </a:r>
+            <a:r>
+              <a:rPr lang="en-US" dirty="0" err="1"/>
+              <a:t>mô</a:t>
+            </a:r>
+            <a:r>
+              <a:rPr lang="en-US" dirty="0"/>
+              <a:t> </a:t>
+            </a:r>
+            <a:r>
+              <a:rPr lang="en-US" dirty="0" err="1"/>
+              <a:t>hình</a:t>
+            </a:r>
+            <a:r>
+              <a:rPr lang="en-US" dirty="0"/>
+              <a:t> </a:t>
+            </a:r>
+            <a:r>
+              <a:rPr lang="en-US" dirty="0" err="1"/>
+              <a:t>và</a:t>
+            </a:r>
+            <a:r>
+              <a:rPr lang="en-US" dirty="0"/>
+              <a:t> </a:t>
+            </a:r>
+            <a:r>
+              <a:rPr lang="en-US" dirty="0" err="1"/>
+              <a:t>thử</a:t>
+            </a:r>
+            <a:r>
+              <a:rPr lang="en-US" dirty="0"/>
+              <a:t> </a:t>
+            </a:r>
+            <a:r>
+              <a:rPr lang="en-US" dirty="0" err="1"/>
+              <a:t>nghiệm</a:t>
             </a:r>
             <a:endParaRPr lang="vi-VN" dirty="0"/>
           </a:p>
@@ -13083,10 +13115,10 @@
       </p:sp>
       <p:sp>
         <p:nvSpPr>
-          <p:cNvPr id="3" name="Subtitle 2">
+          <p:cNvPr id="3" name="Content Placeholder 2">
             <a:extLst>
               <a:ext uri="{FF2B5EF4-FFF2-40B4-BE49-F238E27FC236}">
-                <a16:creationId xmlns:a16="http://schemas.microsoft.com/office/drawing/2014/main" id="{B1CAAD64-6DAD-49D4-9CA1-9D8A6F0FD691}"/>
+                <a16:creationId xmlns:a16="http://schemas.microsoft.com/office/drawing/2014/main" id="{36B77C27-FE88-4214-8173-C40E2F3F9948}"/>
               </a:ext>
             </a:extLst>
           </p:cNvPr>
@@ -13094,7 +13126,7 @@
             <a:spLocks noGrp="1"/>
           </p:cNvSpPr>
           <p:nvPr>
-            <p:ph type="subTitle" idx="1"/>
+            <p:ph idx="1"/>
           </p:nvPr>
         </p:nvSpPr>
         <p:spPr/>
@@ -13102,14 +13134,225 @@
           <a:bodyPr/>
           <a:lstStyle/>
           <a:p>
-            <a:endParaRPr lang="vi-VN"/>
+            <a:r>
+              <a:rPr lang="en-US" dirty="0"/>
+              <a:t>Do </a:t>
+            </a:r>
+            <a:r>
+              <a:rPr lang="en-US" dirty="0" err="1"/>
+              <a:t>khối</a:t>
+            </a:r>
+            <a:r>
+              <a:rPr lang="en-US" dirty="0"/>
+              <a:t> </a:t>
+            </a:r>
+            <a:r>
+              <a:rPr lang="en-US" dirty="0" err="1"/>
+              <a:t>lượng</a:t>
+            </a:r>
+            <a:r>
+              <a:rPr lang="en-US" dirty="0"/>
+              <a:t> </a:t>
+            </a:r>
+            <a:r>
+              <a:rPr lang="en-US" dirty="0" err="1"/>
+              <a:t>dữ</a:t>
+            </a:r>
+            <a:r>
+              <a:rPr lang="en-US" dirty="0"/>
+              <a:t> </a:t>
+            </a:r>
+            <a:r>
+              <a:rPr lang="en-US" dirty="0" err="1"/>
+              <a:t>liệu</a:t>
+            </a:r>
+            <a:r>
+              <a:rPr lang="en-US" dirty="0"/>
+              <a:t> </a:t>
+            </a:r>
+            <a:r>
+              <a:rPr lang="en-US" dirty="0" err="1"/>
+              <a:t>lớn</a:t>
+            </a:r>
+            <a:r>
+              <a:rPr lang="en-US" dirty="0"/>
+              <a:t>, </a:t>
+            </a:r>
+            <a:r>
+              <a:rPr lang="en-US" dirty="0" err="1"/>
+              <a:t>không</a:t>
+            </a:r>
+            <a:r>
+              <a:rPr lang="en-US" dirty="0"/>
+              <a:t> </a:t>
+            </a:r>
+            <a:r>
+              <a:rPr lang="en-US" dirty="0" err="1"/>
+              <a:t>thể</a:t>
+            </a:r>
+            <a:r>
+              <a:rPr lang="en-US" dirty="0"/>
+              <a:t> </a:t>
+            </a:r>
+            <a:r>
+              <a:rPr lang="en-US" dirty="0" err="1"/>
+              <a:t>thử</a:t>
+            </a:r>
+            <a:r>
+              <a:rPr lang="en-US" dirty="0"/>
+              <a:t> </a:t>
+            </a:r>
+            <a:r>
+              <a:rPr lang="en-US" dirty="0" err="1"/>
+              <a:t>nghiệm</a:t>
+            </a:r>
+            <a:r>
+              <a:rPr lang="en-US" dirty="0"/>
+              <a:t> </a:t>
+            </a:r>
+            <a:r>
+              <a:rPr lang="en-US" dirty="0" err="1"/>
+              <a:t>được</a:t>
+            </a:r>
+            <a:r>
+              <a:rPr lang="en-US" dirty="0"/>
+              <a:t> </a:t>
+            </a:r>
+            <a:r>
+              <a:rPr lang="en-US" dirty="0" err="1"/>
+              <a:t>mô</a:t>
+            </a:r>
+            <a:r>
+              <a:rPr lang="en-US" dirty="0"/>
+              <a:t> </a:t>
+            </a:r>
+            <a:r>
+              <a:rPr lang="en-US" dirty="0" err="1"/>
+              <a:t>hình</a:t>
+            </a:r>
+            <a:r>
+              <a:rPr lang="en-US" dirty="0"/>
+              <a:t> </a:t>
+            </a:r>
+            <a:r>
+              <a:rPr lang="en-US" dirty="0" err="1"/>
+              <a:t>học</a:t>
+            </a:r>
+            <a:r>
+              <a:rPr lang="en-US" dirty="0"/>
+              <a:t> SVM </a:t>
+            </a:r>
+            <a:r>
+              <a:rPr lang="en-US" dirty="0" err="1"/>
+              <a:t>cũng</a:t>
+            </a:r>
+            <a:r>
+              <a:rPr lang="en-US" dirty="0"/>
+              <a:t> </a:t>
+            </a:r>
+            <a:r>
+              <a:rPr lang="en-US" dirty="0" err="1"/>
+              <a:t>như</a:t>
+            </a:r>
+            <a:r>
+              <a:rPr lang="en-US" dirty="0"/>
+              <a:t> </a:t>
+            </a:r>
+            <a:r>
+              <a:rPr lang="en-US" dirty="0" err="1"/>
+              <a:t>thử</a:t>
+            </a:r>
+            <a:r>
+              <a:rPr lang="en-US" dirty="0"/>
+              <a:t> </a:t>
+            </a:r>
+            <a:r>
+              <a:rPr lang="en-US" dirty="0" err="1"/>
+              <a:t>nghiệm</a:t>
+            </a:r>
+            <a:r>
+              <a:rPr lang="en-US" dirty="0"/>
+              <a:t> </a:t>
+            </a:r>
+            <a:r>
+              <a:rPr lang="en-US" dirty="0" err="1"/>
+              <a:t>nhiều</a:t>
+            </a:r>
+            <a:r>
+              <a:rPr lang="en-US" dirty="0"/>
+              <a:t> </a:t>
+            </a:r>
+            <a:r>
+              <a:rPr lang="en-US" dirty="0" err="1"/>
+              <a:t>siêu</a:t>
+            </a:r>
+            <a:r>
+              <a:rPr lang="en-US" dirty="0"/>
+              <a:t> </a:t>
+            </a:r>
+            <a:r>
+              <a:rPr lang="en-US" dirty="0" err="1"/>
+              <a:t>tham</a:t>
+            </a:r>
+            <a:r>
+              <a:rPr lang="en-US" dirty="0"/>
+              <a:t> </a:t>
+            </a:r>
+            <a:r>
+              <a:rPr lang="en-US" dirty="0" err="1"/>
+              <a:t>số</a:t>
+            </a:r>
+            <a:r>
+              <a:rPr lang="en-US" dirty="0"/>
+              <a:t> </a:t>
+            </a:r>
+            <a:r>
+              <a:rPr lang="en-US" dirty="0" err="1"/>
+              <a:t>khác</a:t>
+            </a:r>
+            <a:r>
+              <a:rPr lang="en-US" dirty="0"/>
+              <a:t> </a:t>
+            </a:r>
+            <a:r>
+              <a:rPr lang="en-US" dirty="0" err="1"/>
+              <a:t>nhau</a:t>
+            </a:r>
+            <a:r>
+              <a:rPr lang="en-US" dirty="0"/>
+              <a:t> </a:t>
+            </a:r>
+            <a:r>
+              <a:rPr lang="en-US" dirty="0" err="1"/>
+              <a:t>của</a:t>
+            </a:r>
+            <a:r>
+              <a:rPr lang="en-US" dirty="0"/>
+              <a:t> </a:t>
+            </a:r>
+            <a:r>
+              <a:rPr lang="en-US" dirty="0" err="1"/>
+              <a:t>mô</a:t>
+            </a:r>
+            <a:r>
+              <a:rPr lang="en-US" dirty="0"/>
+              <a:t> </a:t>
+            </a:r>
+            <a:r>
+              <a:rPr lang="en-US" dirty="0" err="1"/>
+              <a:t>hình</a:t>
+            </a:r>
+            <a:r>
+              <a:rPr lang="en-US" dirty="0"/>
+              <a:t> Neuron Network</a:t>
+            </a:r>
           </a:p>
         </p:txBody>
       </p:sp>
     </p:spTree>
     <p:extLst>
       <p:ext uri="{BB962C8B-B14F-4D97-AF65-F5344CB8AC3E}">
-        <p14:creationId xmlns:p14="http://schemas.microsoft.com/office/powerpoint/2010/main" val="3522696618"/>
+        <p14:creationId xmlns:p14="http://schemas.microsoft.com/office/powerpoint/2010/main" val="2144853111"/>
       </p:ext>
     </p:extLst>
   </p:cSld>
@@ -13141,7 +13384,7 @@
           <p:cNvPr id="2" name="Title 1">
             <a:extLst>
               <a:ext uri="{FF2B5EF4-FFF2-40B4-BE49-F238E27FC236}">
-                <a16:creationId xmlns:a16="http://schemas.microsoft.com/office/drawing/2014/main" id="{3E07D542-6E83-4235-A531-BDEAA4F39E0D}"/>
+                <a16:creationId xmlns:a16="http://schemas.microsoft.com/office/drawing/2014/main" id="{07A80883-2B13-4A49-B552-25325EC20374}"/>
               </a:ext>
             </a:extLst>
           </p:cNvPr>
@@ -13157,18 +13400,126 @@
           <a:bodyPr/>
           <a:lstStyle/>
           <a:p>
+            <a:r>
+              <a:rPr lang="en-US" dirty="0" err="1"/>
+              <a:t>Tổng</a:t>
+            </a:r>
+            <a:r>
+              <a:rPr lang="en-US" dirty="0"/>
+              <a:t> </a:t>
+            </a:r>
+            <a:r>
+              <a:rPr lang="en-US" dirty="0" err="1"/>
+              <a:t>kết</a:t>
+            </a:r>
+            <a:endParaRPr lang="vi-VN" dirty="0"/>
+          </a:p>
+        </p:txBody>
+      </p:sp>
+      <p:sp>
+        <p:nvSpPr>
+          <p:cNvPr id="3" name="Text Placeholder 2">
+            <a:extLst>
+              <a:ext uri="{FF2B5EF4-FFF2-40B4-BE49-F238E27FC236}">
+                <a16:creationId xmlns:a16="http://schemas.microsoft.com/office/drawing/2014/main" id="{CE18A342-537F-4A53-AD53-14D01F922E4F}"/>
+              </a:ext>
+            </a:extLst>
+          </p:cNvPr>
+          <p:cNvSpPr>
+            <a:spLocks noGrp="1"/>
+          </p:cNvSpPr>
+          <p:nvPr>
+            <p:ph type="body" idx="1"/>
+          </p:nvPr>
+        </p:nvSpPr>
+        <p:spPr/>
+        <p:txBody>
+          <a:bodyPr/>
+          <a:lstStyle/>
+          <a:p>
+            <a:endParaRPr lang="vi-VN"/>
+          </a:p>
+        </p:txBody>
+      </p:sp>
+    </p:spTree>
+    <p:extLst>
+      <p:ext uri="{BB962C8B-B14F-4D97-AF65-F5344CB8AC3E}">
+        <p14:creationId xmlns:p14="http://schemas.microsoft.com/office/powerpoint/2010/main" val="334925204"/>
+      </p:ext>
+    </p:extLst>
+  </p:cSld>
+  <p:clrMapOvr>
+    <a:masterClrMapping/>
+  </p:clrMapOvr>
+</p:sld>
+</file>
+
+<file path=ppt/slides/slide37.xml><?xml version="1.0" encoding="utf-8"?>
+<p:sld xmlns:a="http://schemas.openxmlformats.org/drawingml/2006/main" xmlns:r="http://schemas.openxmlformats.org/officeDocument/2006/relationships" xmlns:p="http://schemas.openxmlformats.org/presentationml/2006/main">
+  <p:cSld>
+    <p:spTree>
+      <p:nvGrpSpPr>
+        <p:cNvPr id="1" name=""/>
+        <p:cNvGrpSpPr/>
+        <p:nvPr/>
+      </p:nvGrpSpPr>
+      <p:grpSpPr>
+        <a:xfrm>
+          <a:off x="0" y="0"/>
+          <a:ext cx="0" cy="0"/>
+          <a:chOff x="0" y="0"/>
+          <a:chExt cx="0" cy="0"/>
+        </a:xfrm>
+      </p:grpSpPr>
+      <p:sp>
+        <p:nvSpPr>
+          <p:cNvPr id="2" name="Title 1">
+            <a:extLst>
+              <a:ext uri="{FF2B5EF4-FFF2-40B4-BE49-F238E27FC236}">
+                <a16:creationId xmlns:a16="http://schemas.microsoft.com/office/drawing/2014/main" id="{4AD106DC-1A60-44EA-9B45-87C7691BCE09}"/>
+              </a:ext>
+            </a:extLst>
+          </p:cNvPr>
+          <p:cNvSpPr>
+            <a:spLocks noGrp="1"/>
+          </p:cNvSpPr>
+          <p:nvPr>
+            <p:ph type="title"/>
+          </p:nvPr>
+        </p:nvSpPr>
+        <p:spPr/>
+        <p:txBody>
+          <a:bodyPr/>
+          <a:lstStyle/>
+          <a:p>
             <a:pPr algn="ctr"/>
             <a:r>
               <a:rPr lang="en-US" dirty="0" err="1"/>
-              <a:t>Tham</a:t>
-            </a:r>
-            <a:r>
-              <a:rPr lang="en-US" dirty="0"/>
-              <a:t> </a:t>
-            </a:r>
-            <a:r>
-              <a:rPr lang="en-US" dirty="0" err="1"/>
-              <a:t>khảo</a:t>
+              <a:t>Đánh</a:t>
+            </a:r>
+            <a:r>
+              <a:rPr lang="en-US" dirty="0"/>
+              <a:t> </a:t>
+            </a:r>
+            <a:r>
+              <a:rPr lang="en-US" dirty="0" err="1"/>
+              <a:t>giá</a:t>
+            </a:r>
+            <a:r>
+              <a:rPr lang="en-US" dirty="0"/>
+              <a:t> </a:t>
+            </a:r>
+            <a:r>
+              <a:rPr lang="en-US" dirty="0" err="1"/>
+              <a:t>mô</a:t>
+            </a:r>
+            <a:r>
+              <a:rPr lang="en-US" dirty="0"/>
+              <a:t> </a:t>
+            </a:r>
+            <a:r>
+              <a:rPr lang="en-US" dirty="0" err="1"/>
+              <a:t>hình</a:t>
             </a:r>
             <a:endParaRPr lang="vi-VN" dirty="0"/>
           </a:p>
@@ -13179,7 +13530,7 @@
           <p:cNvPr id="3" name="Content Placeholder 2">
             <a:extLst>
               <a:ext uri="{FF2B5EF4-FFF2-40B4-BE49-F238E27FC236}">
-                <a16:creationId xmlns:a16="http://schemas.microsoft.com/office/drawing/2014/main" id="{E64A049A-7A8E-4520-B7E0-F5FA6AE968A4}"/>
+                <a16:creationId xmlns:a16="http://schemas.microsoft.com/office/drawing/2014/main" id="{36B77C27-FE88-4214-8173-C40E2F3F9948}"/>
               </a:ext>
             </a:extLst>
           </p:cNvPr>
@@ -13192,17 +13543,710 @@
         </p:nvSpPr>
         <p:spPr/>
         <p:txBody>
-          <a:bodyPr/>
+          <a:bodyPr>
+            <a:normAutofit/>
+          </a:bodyPr>
           <a:lstStyle/>
           <a:p>
+            <a:r>
+              <a:rPr lang="vi-VN" dirty="0"/>
+              <a:t>Độ chính xác không cao </a:t>
+            </a:r>
+            <a:r>
+              <a:rPr lang="en-US" dirty="0" err="1"/>
+              <a:t>nhưng</a:t>
+            </a:r>
+            <a:r>
+              <a:rPr lang="en-US" dirty="0"/>
+              <a:t> </a:t>
+            </a:r>
+            <a:r>
+              <a:rPr lang="en-US" dirty="0" err="1"/>
+              <a:t>cũng</a:t>
+            </a:r>
+            <a:r>
+              <a:rPr lang="en-US" dirty="0"/>
+              <a:t> </a:t>
+            </a:r>
+            <a:r>
+              <a:rPr lang="en-US" dirty="0" err="1"/>
+              <a:t>đủ</a:t>
+            </a:r>
+            <a:r>
+              <a:rPr lang="en-US" dirty="0"/>
+              <a:t> </a:t>
+            </a:r>
+            <a:r>
+              <a:rPr lang="en-US" dirty="0" err="1"/>
+              <a:t>tốt</a:t>
+            </a:r>
+            <a:br>
+              <a:rPr lang="en-US" dirty="0"/>
+            </a:br>
+            <a:r>
+              <a:rPr lang="vi-VN" dirty="0"/>
+              <a:t>(khoảng 75-80%)</a:t>
+            </a:r>
+          </a:p>
+          <a:p>
+            <a:r>
+              <a:rPr lang="vi-VN" dirty="0"/>
+              <a:t>Sử dụng phương pháp </a:t>
+            </a:r>
+            <a:r>
+              <a:rPr lang="vi-VN" dirty="0" err="1"/>
+              <a:t>bagging</a:t>
+            </a:r>
+            <a:r>
+              <a:rPr lang="vi-VN" dirty="0"/>
+              <a:t> để tăng tốc độ chạy mô hình </a:t>
+            </a:r>
+            <a:r>
+              <a:rPr lang="vi-VN" dirty="0" err="1"/>
+              <a:t>neuron</a:t>
+            </a:r>
+            <a:r>
+              <a:rPr lang="vi-VN" dirty="0"/>
+              <a:t> </a:t>
+            </a:r>
+            <a:r>
+              <a:rPr lang="vi-VN" dirty="0" err="1"/>
+              <a:t>network</a:t>
+            </a:r>
+            <a:r>
+              <a:rPr lang="vi-VN" dirty="0"/>
+              <a:t> mà lại giảm </a:t>
+            </a:r>
+            <a:r>
+              <a:rPr lang="vi-VN" dirty="0" err="1"/>
+              <a:t>overfit</a:t>
+            </a:r>
+            <a:r>
+              <a:rPr lang="en-US" dirty="0"/>
+              <a:t>, </a:t>
+            </a:r>
+            <a:r>
+              <a:rPr lang="en-US" dirty="0" err="1"/>
+              <a:t>giúp</a:t>
+            </a:r>
+            <a:r>
+              <a:rPr lang="en-US" dirty="0"/>
+              <a:t> </a:t>
+            </a:r>
+            <a:r>
+              <a:rPr lang="en-US" dirty="0" err="1"/>
+              <a:t>mô</a:t>
+            </a:r>
+            <a:r>
+              <a:rPr lang="en-US" dirty="0"/>
+              <a:t> </a:t>
+            </a:r>
+            <a:r>
+              <a:rPr lang="en-US" dirty="0" err="1"/>
+              <a:t>hình</a:t>
+            </a:r>
+            <a:r>
+              <a:rPr lang="en-US" dirty="0"/>
+              <a:t> </a:t>
+            </a:r>
+            <a:r>
+              <a:rPr lang="en-US" dirty="0" err="1"/>
+              <a:t>này</a:t>
+            </a:r>
+            <a:r>
+              <a:rPr lang="en-US" dirty="0"/>
+              <a:t> </a:t>
+            </a:r>
+            <a:r>
+              <a:rPr lang="en-US" dirty="0" err="1"/>
+              <a:t>đủ</a:t>
+            </a:r>
+            <a:r>
+              <a:rPr lang="en-US" dirty="0"/>
+              <a:t> </a:t>
+            </a:r>
+            <a:r>
+              <a:rPr lang="en-US" dirty="0" err="1"/>
+              <a:t>sức</a:t>
+            </a:r>
+            <a:r>
+              <a:rPr lang="en-US" dirty="0"/>
+              <a:t> </a:t>
+            </a:r>
+            <a:r>
+              <a:rPr lang="en-US" dirty="0" err="1"/>
+              <a:t>chạy</a:t>
+            </a:r>
+            <a:r>
+              <a:rPr lang="en-US" dirty="0"/>
+              <a:t> </a:t>
+            </a:r>
+            <a:r>
+              <a:rPr lang="en-US" dirty="0" err="1"/>
+              <a:t>trên</a:t>
+            </a:r>
+            <a:r>
+              <a:rPr lang="en-US" dirty="0"/>
+              <a:t> </a:t>
+            </a:r>
+            <a:r>
+              <a:rPr lang="en-US" dirty="0" err="1"/>
+              <a:t>toàn</a:t>
+            </a:r>
+            <a:r>
+              <a:rPr lang="en-US" dirty="0"/>
+              <a:t> </a:t>
+            </a:r>
+            <a:r>
+              <a:rPr lang="en-US" dirty="0" err="1"/>
+              <a:t>dữ</a:t>
+            </a:r>
+            <a:r>
+              <a:rPr lang="en-US" dirty="0"/>
+              <a:t> </a:t>
+            </a:r>
+            <a:r>
+              <a:rPr lang="en-US" dirty="0" err="1"/>
+              <a:t>liệu</a:t>
+            </a:r>
+            <a:r>
+              <a:rPr lang="en-US" dirty="0"/>
+              <a:t> </a:t>
+            </a:r>
+            <a:r>
+              <a:rPr lang="en-US" dirty="0" err="1"/>
+              <a:t>trong</a:t>
+            </a:r>
+            <a:r>
+              <a:rPr lang="en-US" dirty="0"/>
+              <a:t> </a:t>
+            </a:r>
+            <a:r>
+              <a:rPr lang="en-US" dirty="0" err="1"/>
+              <a:t>thời</a:t>
+            </a:r>
+            <a:r>
+              <a:rPr lang="en-US" dirty="0"/>
+              <a:t> </a:t>
+            </a:r>
+            <a:r>
+              <a:rPr lang="en-US" dirty="0" err="1"/>
+              <a:t>gian</a:t>
+            </a:r>
+            <a:r>
+              <a:rPr lang="en-US" dirty="0"/>
+              <a:t> </a:t>
+            </a:r>
+            <a:r>
+              <a:rPr lang="en-US" dirty="0" err="1"/>
+              <a:t>cho</a:t>
+            </a:r>
+            <a:r>
+              <a:rPr lang="en-US" dirty="0"/>
+              <a:t> </a:t>
+            </a:r>
+            <a:r>
+              <a:rPr lang="en-US" dirty="0" err="1"/>
+              <a:t>phép</a:t>
+            </a:r>
+            <a:br>
+              <a:rPr lang="en-US" dirty="0"/>
+            </a:br>
+            <a:r>
+              <a:rPr lang="en-US" dirty="0"/>
+              <a:t>(&lt; 20 </a:t>
+            </a:r>
+            <a:r>
+              <a:rPr lang="en-US" dirty="0" err="1"/>
+              <a:t>phút</a:t>
+            </a:r>
+            <a:r>
+              <a:rPr lang="en-US" dirty="0"/>
+              <a:t>)</a:t>
+            </a:r>
             <a:endParaRPr lang="vi-VN" dirty="0"/>
+          </a:p>
+          <a:p>
+            <a:r>
+              <a:rPr lang="vi-VN" dirty="0"/>
+              <a:t>Không đủ khả năng </a:t>
+            </a:r>
+            <a:r>
+              <a:rPr lang="en-US" dirty="0" err="1"/>
+              <a:t>thử</a:t>
+            </a:r>
+            <a:r>
+              <a:rPr lang="en-US" dirty="0"/>
+              <a:t> </a:t>
+            </a:r>
+            <a:r>
+              <a:rPr lang="en-US" dirty="0" err="1"/>
+              <a:t>nghiệm</a:t>
+            </a:r>
+            <a:r>
+              <a:rPr lang="en-US" dirty="0"/>
+              <a:t> </a:t>
+            </a:r>
+            <a:r>
+              <a:rPr lang="vi-VN" dirty="0"/>
+              <a:t>toàn bộ dữ liệu do thời gian xử lý khá lâu</a:t>
+            </a:r>
+            <a:endParaRPr lang="en-US" dirty="0"/>
           </a:p>
         </p:txBody>
       </p:sp>
     </p:spTree>
     <p:extLst>
       <p:ext uri="{BB962C8B-B14F-4D97-AF65-F5344CB8AC3E}">
-        <p14:creationId xmlns:p14="http://schemas.microsoft.com/office/powerpoint/2010/main" val="1981201201"/>
+        <p14:creationId xmlns:p14="http://schemas.microsoft.com/office/powerpoint/2010/main" val="3473368064"/>
+      </p:ext>
+    </p:extLst>
+  </p:cSld>
+  <p:clrMapOvr>
+    <a:masterClrMapping/>
+  </p:clrMapOvr>
+</p:sld>
+</file>
+
+<file path=ppt/slides/slide38.xml><?xml version="1.0" encoding="utf-8"?>
+<p:sld xmlns:a="http://schemas.openxmlformats.org/drawingml/2006/main" xmlns:r="http://schemas.openxmlformats.org/officeDocument/2006/relationships" xmlns:p="http://schemas.openxmlformats.org/presentationml/2006/main">
+  <p:cSld>
+    <p:spTree>
+      <p:nvGrpSpPr>
+        <p:cNvPr id="1" name=""/>
+        <p:cNvGrpSpPr/>
+        <p:nvPr/>
+      </p:nvGrpSpPr>
+      <p:grpSpPr>
+        <a:xfrm>
+          <a:off x="0" y="0"/>
+          <a:ext cx="0" cy="0"/>
+          <a:chOff x="0" y="0"/>
+          <a:chExt cx="0" cy="0"/>
+        </a:xfrm>
+      </p:grpSpPr>
+      <p:sp>
+        <p:nvSpPr>
+          <p:cNvPr id="2" name="Title 1">
+            <a:extLst>
+              <a:ext uri="{FF2B5EF4-FFF2-40B4-BE49-F238E27FC236}">
+                <a16:creationId xmlns:a16="http://schemas.microsoft.com/office/drawing/2014/main" id="{4AD106DC-1A60-44EA-9B45-87C7691BCE09}"/>
+              </a:ext>
+            </a:extLst>
+          </p:cNvPr>
+          <p:cNvSpPr>
+            <a:spLocks noGrp="1"/>
+          </p:cNvSpPr>
+          <p:nvPr>
+            <p:ph type="title"/>
+          </p:nvPr>
+        </p:nvSpPr>
+        <p:spPr/>
+        <p:txBody>
+          <a:bodyPr/>
+          <a:lstStyle/>
+          <a:p>
+            <a:pPr algn="ctr"/>
+            <a:r>
+              <a:rPr lang="en-US" dirty="0" err="1"/>
+              <a:t>Đánh</a:t>
+            </a:r>
+            <a:r>
+              <a:rPr lang="en-US" dirty="0"/>
+              <a:t> </a:t>
+            </a:r>
+            <a:r>
+              <a:rPr lang="en-US" dirty="0" err="1"/>
+              <a:t>giá</a:t>
+            </a:r>
+            <a:r>
+              <a:rPr lang="en-US" dirty="0"/>
+              <a:t> </a:t>
+            </a:r>
+            <a:r>
+              <a:rPr lang="en-US" dirty="0" err="1"/>
+              <a:t>đồ</a:t>
+            </a:r>
+            <a:r>
+              <a:rPr lang="en-US" dirty="0"/>
+              <a:t> </a:t>
+            </a:r>
+            <a:r>
+              <a:rPr lang="en-US" dirty="0" err="1"/>
+              <a:t>án</a:t>
+            </a:r>
+            <a:r>
+              <a:rPr lang="en-US" dirty="0"/>
+              <a:t> (</a:t>
+            </a:r>
+            <a:r>
+              <a:rPr lang="en-US" dirty="0" err="1"/>
+              <a:t>chiêm</a:t>
+            </a:r>
+            <a:r>
+              <a:rPr lang="en-US" dirty="0"/>
+              <a:t> </a:t>
+            </a:r>
+            <a:r>
+              <a:rPr lang="en-US" dirty="0" err="1"/>
+              <a:t>nghiệm</a:t>
+            </a:r>
+            <a:r>
+              <a:rPr lang="en-US" dirty="0"/>
+              <a:t>)</a:t>
+            </a:r>
+            <a:endParaRPr lang="vi-VN" dirty="0"/>
+          </a:p>
+        </p:txBody>
+      </p:sp>
+      <p:sp>
+        <p:nvSpPr>
+          <p:cNvPr id="3" name="Content Placeholder 2">
+            <a:extLst>
+              <a:ext uri="{FF2B5EF4-FFF2-40B4-BE49-F238E27FC236}">
+                <a16:creationId xmlns:a16="http://schemas.microsoft.com/office/drawing/2014/main" id="{36B77C27-FE88-4214-8173-C40E2F3F9948}"/>
+              </a:ext>
+            </a:extLst>
+          </p:cNvPr>
+          <p:cNvSpPr>
+            <a:spLocks noGrp="1"/>
+          </p:cNvSpPr>
+          <p:nvPr>
+            <p:ph idx="1"/>
+          </p:nvPr>
+        </p:nvSpPr>
+        <p:spPr/>
+        <p:txBody>
+          <a:bodyPr>
+            <a:normAutofit/>
+          </a:bodyPr>
+          <a:lstStyle/>
+          <a:p>
+            <a:pPr marL="0" indent="0">
+              <a:buNone/>
+            </a:pPr>
+            <a:r>
+              <a:rPr lang="vi-VN" dirty="0"/>
+              <a:t>Chưa tốt</a:t>
+            </a:r>
+            <a:r>
+              <a:rPr lang="en-US" dirty="0"/>
+              <a:t> 🙃</a:t>
+            </a:r>
+            <a:endParaRPr lang="vi-VN" dirty="0"/>
+          </a:p>
+          <a:p>
+            <a:r>
+              <a:rPr lang="vi-VN" dirty="0"/>
+              <a:t>Thời gian làm khá gấp rút do suy nghĩ đề tài muộn</a:t>
+            </a:r>
+          </a:p>
+          <a:p>
+            <a:r>
+              <a:rPr lang="vi-VN" dirty="0"/>
+              <a:t>Không hoàn thành sớm </a:t>
+            </a:r>
+            <a:r>
+              <a:rPr lang="en-US" dirty="0" err="1"/>
+              <a:t>được</a:t>
+            </a:r>
+            <a:r>
+              <a:rPr lang="vi-VN" dirty="0"/>
+              <a:t> đồ án</a:t>
+            </a:r>
+          </a:p>
+          <a:p>
+            <a:r>
+              <a:rPr lang="vi-VN" dirty="0"/>
+              <a:t>Không tìm được nguồn dữ liệu chuyên cho đề tài của nhóm</a:t>
+            </a:r>
+          </a:p>
+          <a:p>
+            <a:r>
+              <a:rPr lang="vi-VN" dirty="0"/>
+              <a:t>Chưa có </a:t>
+            </a:r>
+            <a:r>
+              <a:rPr lang="vi-VN" dirty="0" err="1"/>
+              <a:t>pipeline</a:t>
+            </a:r>
+            <a:r>
+              <a:rPr lang="vi-VN" dirty="0"/>
+              <a:t> tổng quát.</a:t>
+            </a:r>
+            <a:endParaRPr lang="en-US" dirty="0"/>
+          </a:p>
+        </p:txBody>
+      </p:sp>
+    </p:spTree>
+    <p:extLst>
+      <p:ext uri="{BB962C8B-B14F-4D97-AF65-F5344CB8AC3E}">
+        <p14:creationId xmlns:p14="http://schemas.microsoft.com/office/powerpoint/2010/main" val="3068223525"/>
+      </p:ext>
+    </p:extLst>
+  </p:cSld>
+  <p:clrMapOvr>
+    <a:masterClrMapping/>
+  </p:clrMapOvr>
+</p:sld>
+</file>
+
+<file path=ppt/slides/slide39.xml><?xml version="1.0" encoding="utf-8"?>
+<p:sld xmlns:a="http://schemas.openxmlformats.org/drawingml/2006/main" xmlns:r="http://schemas.openxmlformats.org/officeDocument/2006/relationships" xmlns:p="http://schemas.openxmlformats.org/presentationml/2006/main">
+  <p:cSld>
+    <p:spTree>
+      <p:nvGrpSpPr>
+        <p:cNvPr id="1" name=""/>
+        <p:cNvGrpSpPr/>
+        <p:nvPr/>
+      </p:nvGrpSpPr>
+      <p:grpSpPr>
+        <a:xfrm>
+          <a:off x="0" y="0"/>
+          <a:ext cx="0" cy="0"/>
+          <a:chOff x="0" y="0"/>
+          <a:chExt cx="0" cy="0"/>
+        </a:xfrm>
+      </p:grpSpPr>
+      <p:sp>
+        <p:nvSpPr>
+          <p:cNvPr id="2" name="Title 1">
+            <a:extLst>
+              <a:ext uri="{FF2B5EF4-FFF2-40B4-BE49-F238E27FC236}">
+                <a16:creationId xmlns:a16="http://schemas.microsoft.com/office/drawing/2014/main" id="{4AD106DC-1A60-44EA-9B45-87C7691BCE09}"/>
+              </a:ext>
+            </a:extLst>
+          </p:cNvPr>
+          <p:cNvSpPr>
+            <a:spLocks noGrp="1"/>
+          </p:cNvSpPr>
+          <p:nvPr>
+            <p:ph type="title"/>
+          </p:nvPr>
+        </p:nvSpPr>
+        <p:spPr/>
+        <p:txBody>
+          <a:bodyPr/>
+          <a:lstStyle/>
+          <a:p>
+            <a:pPr algn="ctr"/>
+            <a:r>
+              <a:rPr lang="en-US" dirty="0" err="1"/>
+              <a:t>Đánh</a:t>
+            </a:r>
+            <a:r>
+              <a:rPr lang="en-US" dirty="0"/>
+              <a:t> </a:t>
+            </a:r>
+            <a:r>
+              <a:rPr lang="en-US" dirty="0" err="1"/>
+              <a:t>giá</a:t>
+            </a:r>
+            <a:r>
+              <a:rPr lang="en-US" dirty="0"/>
+              <a:t> </a:t>
+            </a:r>
+            <a:r>
+              <a:rPr lang="en-US" dirty="0" err="1"/>
+              <a:t>đồ</a:t>
+            </a:r>
+            <a:r>
+              <a:rPr lang="en-US" dirty="0"/>
+              <a:t> </a:t>
+            </a:r>
+            <a:r>
+              <a:rPr lang="en-US" dirty="0" err="1"/>
+              <a:t>án</a:t>
+            </a:r>
+            <a:r>
+              <a:rPr lang="en-US" dirty="0"/>
+              <a:t> (</a:t>
+            </a:r>
+            <a:r>
+              <a:rPr lang="en-US" dirty="0" err="1"/>
+              <a:t>chiêm</a:t>
+            </a:r>
+            <a:r>
+              <a:rPr lang="en-US" dirty="0"/>
+              <a:t> </a:t>
+            </a:r>
+            <a:r>
+              <a:rPr lang="en-US" dirty="0" err="1"/>
+              <a:t>nghiệm</a:t>
+            </a:r>
+            <a:r>
+              <a:rPr lang="en-US" dirty="0"/>
+              <a:t>)</a:t>
+            </a:r>
+            <a:endParaRPr lang="vi-VN" dirty="0"/>
+          </a:p>
+        </p:txBody>
+      </p:sp>
+      <p:sp>
+        <p:nvSpPr>
+          <p:cNvPr id="3" name="Content Placeholder 2">
+            <a:extLst>
+              <a:ext uri="{FF2B5EF4-FFF2-40B4-BE49-F238E27FC236}">
+                <a16:creationId xmlns:a16="http://schemas.microsoft.com/office/drawing/2014/main" id="{36B77C27-FE88-4214-8173-C40E2F3F9948}"/>
+              </a:ext>
+            </a:extLst>
+          </p:cNvPr>
+          <p:cNvSpPr>
+            <a:spLocks noGrp="1"/>
+          </p:cNvSpPr>
+          <p:nvPr>
+            <p:ph idx="1"/>
+          </p:nvPr>
+        </p:nvSpPr>
+        <p:spPr>
+          <a:xfrm>
+            <a:off x="838200" y="1825625"/>
+            <a:ext cx="10655300" cy="4351338"/>
+          </a:xfrm>
+        </p:spPr>
+        <p:txBody>
+          <a:bodyPr>
+            <a:normAutofit/>
+          </a:bodyPr>
+          <a:lstStyle/>
+          <a:p>
+            <a:pPr marL="0" indent="0">
+              <a:buNone/>
+            </a:pPr>
+            <a:r>
+              <a:rPr lang="vi-VN" dirty="0"/>
+              <a:t>Tốt</a:t>
+            </a:r>
+            <a:r>
+              <a:rPr lang="en-US" dirty="0"/>
+              <a:t> 👍</a:t>
+            </a:r>
+            <a:endParaRPr lang="vi-VN" dirty="0"/>
+          </a:p>
+          <a:p>
+            <a:r>
+              <a:rPr lang="vi-VN" dirty="0"/>
+              <a:t>Thu thập được lượng lớn dữ liệu.</a:t>
+            </a:r>
+          </a:p>
+          <a:p>
+            <a:r>
+              <a:rPr lang="vi-VN" dirty="0"/>
+              <a:t>Có khả năng tìm hiểu được các kiến thức cần thiết.</a:t>
+            </a:r>
+          </a:p>
+          <a:p>
+            <a:r>
+              <a:rPr lang="en-US" dirty="0"/>
+              <a:t>P</a:t>
+            </a:r>
+            <a:r>
+              <a:rPr lang="vi-VN" dirty="0"/>
+              <a:t>hân chi</a:t>
+            </a:r>
+            <a:r>
+              <a:rPr lang="en-US" dirty="0"/>
+              <a:t>a</a:t>
+            </a:r>
+            <a:r>
+              <a:rPr lang="vi-VN" dirty="0"/>
+              <a:t> ra các quy trình khoa học dữ liệu riêng biệt và phân công mỗi thành viên nắm một quy trình riêng chứ không </a:t>
+            </a:r>
+            <a:r>
+              <a:rPr lang="en-US" dirty="0" err="1"/>
+              <a:t>cùng</a:t>
+            </a:r>
+            <a:r>
+              <a:rPr lang="en-US" dirty="0"/>
+              <a:t> </a:t>
+            </a:r>
+            <a:r>
+              <a:rPr lang="en-US" dirty="0" err="1"/>
+              <a:t>làm</a:t>
+            </a:r>
+            <a:r>
+              <a:rPr lang="vi-VN" dirty="0"/>
+              <a:t> chung (phần này nhóm không biết là điều xấu hay điều tốt</a:t>
+            </a:r>
+            <a:r>
+              <a:rPr lang="en-US" dirty="0"/>
+              <a:t>, </a:t>
+            </a:r>
+            <a:r>
+              <a:rPr lang="en-US" dirty="0" err="1"/>
+              <a:t>nhưng</a:t>
+            </a:r>
+            <a:r>
+              <a:rPr lang="en-US" dirty="0"/>
+              <a:t> </a:t>
+            </a:r>
+            <a:r>
+              <a:rPr lang="en-US" dirty="0" err="1"/>
+              <a:t>nhóm</a:t>
+            </a:r>
+            <a:r>
+              <a:rPr lang="en-US" dirty="0"/>
+              <a:t> </a:t>
+            </a:r>
+            <a:r>
+              <a:rPr lang="en-US" dirty="0" err="1"/>
+              <a:t>nghĩ</a:t>
+            </a:r>
+            <a:r>
+              <a:rPr lang="en-US" dirty="0"/>
+              <a:t> </a:t>
+            </a:r>
+            <a:r>
+              <a:rPr lang="en-US" dirty="0" err="1"/>
+              <a:t>khả</a:t>
+            </a:r>
+            <a:r>
+              <a:rPr lang="en-US" dirty="0"/>
+              <a:t> </a:t>
+            </a:r>
+            <a:r>
+              <a:rPr lang="en-US" dirty="0" err="1"/>
+              <a:t>năng</a:t>
+            </a:r>
+            <a:r>
+              <a:rPr lang="en-US" dirty="0"/>
+              <a:t> </a:t>
+            </a:r>
+            <a:r>
+              <a:rPr lang="en-US" dirty="0" err="1"/>
+              <a:t>cao</a:t>
+            </a:r>
+            <a:r>
+              <a:rPr lang="en-US" dirty="0"/>
+              <a:t> </a:t>
+            </a:r>
+            <a:r>
+              <a:rPr lang="en-US" dirty="0" err="1"/>
+              <a:t>là</a:t>
+            </a:r>
+            <a:r>
+              <a:rPr lang="en-US" dirty="0"/>
+              <a:t> </a:t>
+            </a:r>
+            <a:r>
+              <a:rPr lang="en-US" dirty="0" err="1"/>
+              <a:t>tốt</a:t>
+            </a:r>
+            <a:r>
+              <a:rPr lang="en-US" dirty="0"/>
+              <a:t> 👍</a:t>
+            </a:r>
+            <a:r>
+              <a:rPr lang="vi-VN" dirty="0"/>
+              <a:t>).</a:t>
+            </a:r>
+          </a:p>
+        </p:txBody>
+      </p:sp>
+    </p:spTree>
+    <p:extLst>
+      <p:ext uri="{BB962C8B-B14F-4D97-AF65-F5344CB8AC3E}">
+        <p14:creationId xmlns:p14="http://schemas.microsoft.com/office/powerpoint/2010/main" val="2622201153"/>
       </p:ext>
     </p:extLst>
   </p:cSld>
@@ -13548,6 +14592,679 @@
     <p:extLst>
       <p:ext uri="{BB962C8B-B14F-4D97-AF65-F5344CB8AC3E}">
         <p14:creationId xmlns:p14="http://schemas.microsoft.com/office/powerpoint/2010/main" val="2089239967"/>
+      </p:ext>
+    </p:extLst>
+  </p:cSld>
+  <p:clrMapOvr>
+    <a:masterClrMapping/>
+  </p:clrMapOvr>
+</p:sld>
+</file>
+
+<file path=ppt/slides/slide40.xml><?xml version="1.0" encoding="utf-8"?>
+<p:sld xmlns:a="http://schemas.openxmlformats.org/drawingml/2006/main" xmlns:r="http://schemas.openxmlformats.org/officeDocument/2006/relationships" xmlns:p="http://schemas.openxmlformats.org/presentationml/2006/main">
+  <p:cSld>
+    <p:spTree>
+      <p:nvGrpSpPr>
+        <p:cNvPr id="1" name=""/>
+        <p:cNvGrpSpPr/>
+        <p:nvPr/>
+      </p:nvGrpSpPr>
+      <p:grpSpPr>
+        <a:xfrm>
+          <a:off x="0" y="0"/>
+          <a:ext cx="0" cy="0"/>
+          <a:chOff x="0" y="0"/>
+          <a:chExt cx="0" cy="0"/>
+        </a:xfrm>
+      </p:grpSpPr>
+      <p:sp>
+        <p:nvSpPr>
+          <p:cNvPr id="2" name="Title 1">
+            <a:extLst>
+              <a:ext uri="{FF2B5EF4-FFF2-40B4-BE49-F238E27FC236}">
+                <a16:creationId xmlns:a16="http://schemas.microsoft.com/office/drawing/2014/main" id="{4AD106DC-1A60-44EA-9B45-87C7691BCE09}"/>
+              </a:ext>
+            </a:extLst>
+          </p:cNvPr>
+          <p:cNvSpPr>
+            <a:spLocks noGrp="1"/>
+          </p:cNvSpPr>
+          <p:nvPr>
+            <p:ph type="title"/>
+          </p:nvPr>
+        </p:nvSpPr>
+        <p:spPr/>
+        <p:txBody>
+          <a:bodyPr/>
+          <a:lstStyle/>
+          <a:p>
+            <a:pPr algn="ctr"/>
+            <a:r>
+              <a:rPr lang="en-US" dirty="0" err="1"/>
+              <a:t>Hướng</a:t>
+            </a:r>
+            <a:r>
+              <a:rPr lang="en-US" dirty="0"/>
+              <a:t> </a:t>
+            </a:r>
+            <a:r>
+              <a:rPr lang="en-US" dirty="0" err="1"/>
+              <a:t>phát</a:t>
+            </a:r>
+            <a:r>
+              <a:rPr lang="en-US" dirty="0"/>
+              <a:t> </a:t>
+            </a:r>
+            <a:r>
+              <a:rPr lang="en-US" dirty="0" err="1"/>
+              <a:t>triển</a:t>
+            </a:r>
+            <a:endParaRPr lang="vi-VN" dirty="0"/>
+          </a:p>
+        </p:txBody>
+      </p:sp>
+      <p:sp>
+        <p:nvSpPr>
+          <p:cNvPr id="3" name="Content Placeholder 2">
+            <a:extLst>
+              <a:ext uri="{FF2B5EF4-FFF2-40B4-BE49-F238E27FC236}">
+                <a16:creationId xmlns:a16="http://schemas.microsoft.com/office/drawing/2014/main" id="{36B77C27-FE88-4214-8173-C40E2F3F9948}"/>
+              </a:ext>
+            </a:extLst>
+          </p:cNvPr>
+          <p:cNvSpPr>
+            <a:spLocks noGrp="1"/>
+          </p:cNvSpPr>
+          <p:nvPr>
+            <p:ph idx="1"/>
+          </p:nvPr>
+        </p:nvSpPr>
+        <p:spPr/>
+        <p:txBody>
+          <a:bodyPr/>
+          <a:lstStyle/>
+          <a:p>
+            <a:r>
+              <a:rPr lang="en-US" dirty="0" err="1"/>
+              <a:t>Hoàn</a:t>
+            </a:r>
+            <a:r>
+              <a:rPr lang="en-US" dirty="0"/>
+              <a:t> </a:t>
+            </a:r>
+            <a:r>
+              <a:rPr lang="en-US" dirty="0" err="1"/>
+              <a:t>thiện</a:t>
+            </a:r>
+            <a:r>
+              <a:rPr lang="en-US" dirty="0"/>
+              <a:t> pipeline </a:t>
+            </a:r>
+            <a:r>
+              <a:rPr lang="en-US" dirty="0" err="1"/>
+              <a:t>tổng</a:t>
+            </a:r>
+            <a:r>
+              <a:rPr lang="en-US" dirty="0"/>
+              <a:t> </a:t>
+            </a:r>
+            <a:r>
+              <a:rPr lang="en-US" dirty="0" err="1"/>
+              <a:t>quát</a:t>
+            </a:r>
+            <a:endParaRPr lang="en-US" dirty="0"/>
+          </a:p>
+          <a:p>
+            <a:r>
+              <a:rPr lang="en-US" dirty="0" err="1"/>
+              <a:t>Tìm</a:t>
+            </a:r>
+            <a:r>
+              <a:rPr lang="en-US" dirty="0"/>
+              <a:t> </a:t>
+            </a:r>
+            <a:r>
+              <a:rPr lang="en-US" dirty="0" err="1"/>
+              <a:t>cách</a:t>
+            </a:r>
+            <a:r>
+              <a:rPr lang="en-US" dirty="0"/>
+              <a:t> </a:t>
+            </a:r>
+            <a:r>
+              <a:rPr lang="en-US" dirty="0" err="1"/>
+              <a:t>thử</a:t>
+            </a:r>
+            <a:r>
+              <a:rPr lang="en-US" dirty="0"/>
+              <a:t> </a:t>
+            </a:r>
+            <a:r>
+              <a:rPr lang="en-US" dirty="0" err="1"/>
+              <a:t>nghiệm</a:t>
+            </a:r>
+            <a:r>
+              <a:rPr lang="en-US" dirty="0"/>
+              <a:t> </a:t>
+            </a:r>
+            <a:r>
+              <a:rPr lang="en-US" dirty="0" err="1"/>
+              <a:t>nhiều</a:t>
+            </a:r>
+            <a:r>
+              <a:rPr lang="en-US" dirty="0"/>
+              <a:t> </a:t>
+            </a:r>
+            <a:r>
+              <a:rPr lang="en-US" dirty="0" err="1"/>
+              <a:t>hơn</a:t>
+            </a:r>
+            <a:r>
+              <a:rPr lang="en-US" dirty="0"/>
+              <a:t> </a:t>
+            </a:r>
+            <a:r>
+              <a:rPr lang="en-US" dirty="0" err="1"/>
+              <a:t>với</a:t>
+            </a:r>
+            <a:r>
+              <a:rPr lang="en-US" dirty="0"/>
+              <a:t> </a:t>
+            </a:r>
+            <a:r>
+              <a:rPr lang="en-US" dirty="0" err="1"/>
+              <a:t>mô</a:t>
+            </a:r>
+            <a:r>
+              <a:rPr lang="en-US" dirty="0"/>
+              <a:t> </a:t>
+            </a:r>
+            <a:r>
+              <a:rPr lang="en-US" dirty="0" err="1"/>
+              <a:t>hình</a:t>
+            </a:r>
+            <a:endParaRPr lang="en-US" dirty="0"/>
+          </a:p>
+          <a:p>
+            <a:r>
+              <a:rPr lang="en-US" dirty="0" err="1"/>
+              <a:t>Tìm</a:t>
+            </a:r>
+            <a:r>
+              <a:rPr lang="en-US" dirty="0"/>
+              <a:t> </a:t>
+            </a:r>
+            <a:r>
+              <a:rPr lang="en-US" dirty="0" err="1"/>
+              <a:t>hiểu</a:t>
+            </a:r>
+            <a:r>
+              <a:rPr lang="en-US" dirty="0"/>
+              <a:t> </a:t>
+            </a:r>
+            <a:r>
+              <a:rPr lang="en-US" dirty="0" err="1"/>
+              <a:t>các</a:t>
+            </a:r>
+            <a:r>
+              <a:rPr lang="en-US" dirty="0"/>
+              <a:t> </a:t>
+            </a:r>
+            <a:r>
+              <a:rPr lang="en-US" dirty="0" err="1"/>
+              <a:t>kỹ</a:t>
+            </a:r>
+            <a:r>
+              <a:rPr lang="en-US" dirty="0"/>
+              <a:t> </a:t>
+            </a:r>
+            <a:r>
+              <a:rPr lang="en-US" dirty="0" err="1"/>
+              <a:t>thuật</a:t>
+            </a:r>
+            <a:r>
+              <a:rPr lang="en-US" dirty="0"/>
+              <a:t>, </a:t>
+            </a:r>
+            <a:r>
+              <a:rPr lang="en-US" dirty="0" err="1"/>
+              <a:t>mô</a:t>
+            </a:r>
+            <a:r>
+              <a:rPr lang="en-US" dirty="0"/>
+              <a:t> </a:t>
+            </a:r>
+            <a:r>
+              <a:rPr lang="en-US" dirty="0" err="1"/>
+              <a:t>hình</a:t>
+            </a:r>
+            <a:r>
+              <a:rPr lang="en-US" dirty="0"/>
+              <a:t> </a:t>
+            </a:r>
+            <a:r>
+              <a:rPr lang="en-US" dirty="0" err="1"/>
+              <a:t>mới</a:t>
+            </a:r>
+            <a:r>
+              <a:rPr lang="en-US" dirty="0"/>
+              <a:t> </a:t>
+            </a:r>
+            <a:r>
+              <a:rPr lang="en-US" dirty="0" err="1"/>
+              <a:t>tốt</a:t>
+            </a:r>
+            <a:r>
+              <a:rPr lang="en-US" dirty="0"/>
+              <a:t> </a:t>
+            </a:r>
+            <a:r>
+              <a:rPr lang="en-US" dirty="0" err="1"/>
+              <a:t>hơn</a:t>
+            </a:r>
+            <a:r>
+              <a:rPr lang="en-US" dirty="0"/>
+              <a:t> (BERT, Word2Vec,...)</a:t>
+            </a:r>
+          </a:p>
+        </p:txBody>
+      </p:sp>
+      <p:pic>
+        <p:nvPicPr>
+          <p:cNvPr id="5" name="Picture 4" descr="A picture containing indoor&#10;&#10;Description automatically generated">
+            <a:extLst>
+              <a:ext uri="{FF2B5EF4-FFF2-40B4-BE49-F238E27FC236}">
+                <a16:creationId xmlns:a16="http://schemas.microsoft.com/office/drawing/2014/main" id="{706DF6DF-D641-4131-A3D4-67B9983D0F82}"/>
+              </a:ext>
+            </a:extLst>
+          </p:cNvPr>
+          <p:cNvPicPr>
+            <a:picLocks noChangeAspect="1"/>
+          </p:cNvPicPr>
+          <p:nvPr/>
+        </p:nvPicPr>
+        <p:blipFill>
+          <a:blip r:embed="rId2">
+            <a:extLst>
+              <a:ext uri="{28A0092B-C50C-407E-A947-70E740481C1C}">
+                <a14:useLocalDpi xmlns:a14="http://schemas.microsoft.com/office/drawing/2010/main" val="0"/>
+              </a:ext>
+            </a:extLst>
+          </a:blip>
+          <a:stretch>
+            <a:fillRect/>
+          </a:stretch>
+        </p:blipFill>
+        <p:spPr>
+          <a:xfrm>
+            <a:off x="3644900" y="3922733"/>
+            <a:ext cx="4902200" cy="2570142"/>
+          </a:xfrm>
+          <a:prstGeom prst="rect">
+            <a:avLst/>
+          </a:prstGeom>
+        </p:spPr>
+      </p:pic>
+    </p:spTree>
+    <p:extLst>
+      <p:ext uri="{BB962C8B-B14F-4D97-AF65-F5344CB8AC3E}">
+        <p14:creationId xmlns:p14="http://schemas.microsoft.com/office/powerpoint/2010/main" val="546907594"/>
+      </p:ext>
+    </p:extLst>
+  </p:cSld>
+  <p:clrMapOvr>
+    <a:masterClrMapping/>
+  </p:clrMapOvr>
+</p:sld>
+</file>
+
+<file path=ppt/slides/slide41.xml><?xml version="1.0" encoding="utf-8"?>
+<p:sld xmlns:a="http://schemas.openxmlformats.org/drawingml/2006/main" xmlns:r="http://schemas.openxmlformats.org/officeDocument/2006/relationships" xmlns:p="http://schemas.openxmlformats.org/presentationml/2006/main">
+  <p:cSld>
+    <p:spTree>
+      <p:nvGrpSpPr>
+        <p:cNvPr id="1" name=""/>
+        <p:cNvGrpSpPr/>
+        <p:nvPr/>
+      </p:nvGrpSpPr>
+      <p:grpSpPr>
+        <a:xfrm>
+          <a:off x="0" y="0"/>
+          <a:ext cx="0" cy="0"/>
+          <a:chOff x="0" y="0"/>
+          <a:chExt cx="0" cy="0"/>
+        </a:xfrm>
+      </p:grpSpPr>
+      <p:sp>
+        <p:nvSpPr>
+          <p:cNvPr id="2" name="Title 1">
+            <a:extLst>
+              <a:ext uri="{FF2B5EF4-FFF2-40B4-BE49-F238E27FC236}">
+                <a16:creationId xmlns:a16="http://schemas.microsoft.com/office/drawing/2014/main" id="{EF7B82BC-B167-464E-96FE-8AEC25F026BE}"/>
+              </a:ext>
+            </a:extLst>
+          </p:cNvPr>
+          <p:cNvSpPr>
+            <a:spLocks noGrp="1"/>
+          </p:cNvSpPr>
+          <p:nvPr>
+            <p:ph type="ctrTitle"/>
+          </p:nvPr>
+        </p:nvSpPr>
+        <p:spPr/>
+        <p:txBody>
+          <a:bodyPr/>
+          <a:lstStyle/>
+          <a:p>
+            <a:r>
+              <a:rPr lang="en-US" dirty="0"/>
+              <a:t>👏 </a:t>
+            </a:r>
+            <a:r>
+              <a:rPr lang="en-US" dirty="0" err="1"/>
+              <a:t>Kết</a:t>
+            </a:r>
+            <a:r>
+              <a:rPr lang="en-US" dirty="0"/>
+              <a:t> </a:t>
+            </a:r>
+            <a:r>
+              <a:rPr lang="en-US" dirty="0" err="1"/>
+              <a:t>thúc</a:t>
+            </a:r>
+            <a:r>
+              <a:rPr lang="en-US" dirty="0"/>
+              <a:t> 👏</a:t>
+            </a:r>
+            <a:endParaRPr lang="vi-VN" dirty="0"/>
+          </a:p>
+        </p:txBody>
+      </p:sp>
+      <p:sp>
+        <p:nvSpPr>
+          <p:cNvPr id="3" name="Subtitle 2">
+            <a:extLst>
+              <a:ext uri="{FF2B5EF4-FFF2-40B4-BE49-F238E27FC236}">
+                <a16:creationId xmlns:a16="http://schemas.microsoft.com/office/drawing/2014/main" id="{B1CAAD64-6DAD-49D4-9CA1-9D8A6F0FD691}"/>
+              </a:ext>
+            </a:extLst>
+          </p:cNvPr>
+          <p:cNvSpPr>
+            <a:spLocks noGrp="1"/>
+          </p:cNvSpPr>
+          <p:nvPr>
+            <p:ph type="subTitle" idx="1"/>
+          </p:nvPr>
+        </p:nvSpPr>
+        <p:spPr/>
+        <p:txBody>
+          <a:bodyPr/>
+          <a:lstStyle/>
+          <a:p>
+            <a:endParaRPr lang="vi-VN" dirty="0"/>
+          </a:p>
+        </p:txBody>
+      </p:sp>
+    </p:spTree>
+    <p:extLst>
+      <p:ext uri="{BB962C8B-B14F-4D97-AF65-F5344CB8AC3E}">
+        <p14:creationId xmlns:p14="http://schemas.microsoft.com/office/powerpoint/2010/main" val="3522696618"/>
+      </p:ext>
+    </p:extLst>
+  </p:cSld>
+  <p:clrMapOvr>
+    <a:masterClrMapping/>
+  </p:clrMapOvr>
+</p:sld>
+</file>
+
+<file path=ppt/slides/slide42.xml><?xml version="1.0" encoding="utf-8"?>
+<p:sld xmlns:a="http://schemas.openxmlformats.org/drawingml/2006/main" xmlns:r="http://schemas.openxmlformats.org/officeDocument/2006/relationships" xmlns:p="http://schemas.openxmlformats.org/presentationml/2006/main">
+  <p:cSld>
+    <p:spTree>
+      <p:nvGrpSpPr>
+        <p:cNvPr id="1" name=""/>
+        <p:cNvGrpSpPr/>
+        <p:nvPr/>
+      </p:nvGrpSpPr>
+      <p:grpSpPr>
+        <a:xfrm>
+          <a:off x="0" y="0"/>
+          <a:ext cx="0" cy="0"/>
+          <a:chOff x="0" y="0"/>
+          <a:chExt cx="0" cy="0"/>
+        </a:xfrm>
+      </p:grpSpPr>
+      <p:sp>
+        <p:nvSpPr>
+          <p:cNvPr id="2" name="Title 1">
+            <a:extLst>
+              <a:ext uri="{FF2B5EF4-FFF2-40B4-BE49-F238E27FC236}">
+                <a16:creationId xmlns:a16="http://schemas.microsoft.com/office/drawing/2014/main" id="{3E07D542-6E83-4235-A531-BDEAA4F39E0D}"/>
+              </a:ext>
+            </a:extLst>
+          </p:cNvPr>
+          <p:cNvSpPr>
+            <a:spLocks noGrp="1"/>
+          </p:cNvSpPr>
+          <p:nvPr>
+            <p:ph type="title"/>
+          </p:nvPr>
+        </p:nvSpPr>
+        <p:spPr/>
+        <p:txBody>
+          <a:bodyPr/>
+          <a:lstStyle/>
+          <a:p>
+            <a:pPr algn="ctr"/>
+            <a:r>
+              <a:rPr lang="en-US" dirty="0" err="1"/>
+              <a:t>Tham</a:t>
+            </a:r>
+            <a:r>
+              <a:rPr lang="en-US" dirty="0"/>
+              <a:t> </a:t>
+            </a:r>
+            <a:r>
+              <a:rPr lang="en-US" dirty="0" err="1"/>
+              <a:t>khảo</a:t>
+            </a:r>
+            <a:endParaRPr lang="vi-VN" dirty="0"/>
+          </a:p>
+        </p:txBody>
+      </p:sp>
+      <p:sp>
+        <p:nvSpPr>
+          <p:cNvPr id="3" name="Content Placeholder 2">
+            <a:extLst>
+              <a:ext uri="{FF2B5EF4-FFF2-40B4-BE49-F238E27FC236}">
+                <a16:creationId xmlns:a16="http://schemas.microsoft.com/office/drawing/2014/main" id="{E64A049A-7A8E-4520-B7E0-F5FA6AE968A4}"/>
+              </a:ext>
+            </a:extLst>
+          </p:cNvPr>
+          <p:cNvSpPr>
+            <a:spLocks noGrp="1"/>
+          </p:cNvSpPr>
+          <p:nvPr>
+            <p:ph idx="1"/>
+          </p:nvPr>
+        </p:nvSpPr>
+        <p:spPr/>
+        <p:txBody>
+          <a:bodyPr>
+            <a:normAutofit/>
+          </a:bodyPr>
+          <a:lstStyle/>
+          <a:p>
+            <a:r>
+              <a:rPr lang="vi-VN" dirty="0"/>
+              <a:t>Các </a:t>
+            </a:r>
+            <a:r>
+              <a:rPr lang="vi-VN" dirty="0" err="1"/>
+              <a:t>notebook</a:t>
+            </a:r>
+            <a:r>
+              <a:rPr lang="vi-VN" dirty="0"/>
+              <a:t> </a:t>
+            </a:r>
+            <a:r>
+              <a:rPr lang="vi-VN" dirty="0" err="1"/>
+              <a:t>demo</a:t>
+            </a:r>
+            <a:r>
+              <a:rPr lang="vi-VN" dirty="0"/>
+              <a:t> và bài tập của thầy (đặc biệt là bài tập 3 ❤)</a:t>
+            </a:r>
+          </a:p>
+          <a:p>
+            <a:r>
+              <a:rPr lang="vi-VN" sz="1200" dirty="0">
+                <a:hlinkClick r:id="rId2"/>
+              </a:rPr>
+              <a:t>https://www.scraping-bot.io/how-to-scrape-infinite-scroll-pages/</a:t>
+            </a:r>
+            <a:r>
+              <a:rPr lang="en-US" sz="1200" dirty="0"/>
+              <a:t> </a:t>
+            </a:r>
+            <a:endParaRPr lang="vi-VN" sz="1200" dirty="0"/>
+          </a:p>
+          <a:p>
+            <a:r>
+              <a:rPr lang="vi-VN" sz="1200" dirty="0">
+                <a:hlinkClick r:id="rId3"/>
+              </a:rPr>
+              <a:t>https://prodevsblog.com/questions/128808/python-requests-requests-exceptions-toomanyredirects-exceeded-30-redirects</a:t>
+            </a:r>
+            <a:r>
+              <a:rPr lang="en-US" sz="1200" dirty="0">
+                <a:hlinkClick r:id="rId3"/>
+              </a:rPr>
+              <a:t>/</a:t>
+            </a:r>
+            <a:r>
+              <a:rPr lang="en-US" sz="1200" dirty="0"/>
+              <a:t> </a:t>
+            </a:r>
+            <a:endParaRPr lang="vi-VN" sz="1200" dirty="0"/>
+          </a:p>
+          <a:p>
+            <a:r>
+              <a:rPr lang="vi-VN" sz="1200" dirty="0">
+                <a:hlinkClick r:id="rId4"/>
+              </a:rPr>
+              <a:t>https://towardsdatascience.com/text-classification-with-nlp-tf-idf-vs-word2vec-vs-bert-41ff868d1794</a:t>
+            </a:r>
+            <a:r>
+              <a:rPr lang="en-US" sz="1200" dirty="0"/>
+              <a:t> </a:t>
+            </a:r>
+            <a:endParaRPr lang="vi-VN" sz="1200" dirty="0"/>
+          </a:p>
+          <a:p>
+            <a:r>
+              <a:rPr lang="vi-VN" sz="1200" dirty="0">
+                <a:hlinkClick r:id="rId5"/>
+              </a:rPr>
+              <a:t>https://nguyenvanhieu.vn/phan-loai-van-ban-tieng-viet/</a:t>
+            </a:r>
+            <a:r>
+              <a:rPr lang="en-US" sz="1200" dirty="0"/>
+              <a:t> </a:t>
+            </a:r>
+            <a:endParaRPr lang="vi-VN" sz="1200" dirty="0"/>
+          </a:p>
+          <a:p>
+            <a:r>
+              <a:rPr lang="vi-VN" sz="1200" dirty="0">
+                <a:hlinkClick r:id="rId6"/>
+              </a:rPr>
+              <a:t>https://quan.hoabinh.vn/blog/2020/7/85-chuyen-doi-unicode-dung-san-to-hop-voi-python</a:t>
+            </a:r>
+            <a:r>
+              <a:rPr lang="en-US" sz="1200" dirty="0"/>
+              <a:t> </a:t>
+            </a:r>
+          </a:p>
+          <a:p>
+            <a:r>
+              <a:rPr lang="vi-VN" sz="1200" dirty="0">
+                <a:hlinkClick r:id="rId7"/>
+              </a:rPr>
+              <a:t>https://kipalog.com/posts/Gioi-thieu-tien-xu-ly-trong-xu-ly-ngon-ngu-tu-nhien</a:t>
+            </a:r>
+            <a:r>
+              <a:rPr lang="en-US" sz="1200" dirty="0"/>
+              <a:t> </a:t>
+            </a:r>
+            <a:endParaRPr lang="vi-VN" sz="1200" dirty="0"/>
+          </a:p>
+          <a:p>
+            <a:r>
+              <a:rPr lang="vi-VN" dirty="0" err="1"/>
+              <a:t>Document</a:t>
+            </a:r>
+            <a:r>
+              <a:rPr lang="vi-VN" dirty="0"/>
+              <a:t> của </a:t>
+            </a:r>
+            <a:r>
+              <a:rPr lang="vi-VN" dirty="0" err="1"/>
+              <a:t>scikit-learn</a:t>
+            </a:r>
+            <a:r>
+              <a:rPr lang="vi-VN" dirty="0"/>
+              <a:t>, </a:t>
+            </a:r>
+            <a:r>
+              <a:rPr lang="vi-VN" dirty="0" err="1"/>
+              <a:t>pandas</a:t>
+            </a:r>
+            <a:r>
+              <a:rPr lang="vi-VN" dirty="0"/>
+              <a:t>, </a:t>
+            </a:r>
+            <a:r>
+              <a:rPr lang="vi-VN" dirty="0" err="1"/>
+              <a:t>tqdm</a:t>
+            </a:r>
+            <a:r>
+              <a:rPr lang="vi-VN" dirty="0"/>
+              <a:t>, </a:t>
+            </a:r>
+            <a:r>
+              <a:rPr lang="vi-VN" dirty="0" err="1"/>
+              <a:t>pandarallel</a:t>
+            </a:r>
+            <a:endParaRPr lang="vi-VN" dirty="0"/>
+          </a:p>
+          <a:p>
+            <a:r>
+              <a:rPr lang="vi-VN" dirty="0"/>
+              <a:t>Và hằng hà sa số câu trả lời cho những câu hỏi ngu ngốc của nhóm tụi em trên </a:t>
+            </a:r>
+            <a:r>
+              <a:rPr lang="vi-VN" dirty="0" err="1"/>
+              <a:t>stackoverflow</a:t>
+            </a:r>
+            <a:r>
+              <a:rPr lang="vi-VN" dirty="0"/>
+              <a:t> và </a:t>
+            </a:r>
+            <a:r>
+              <a:rPr lang="vi-VN" dirty="0" err="1"/>
+              <a:t>google</a:t>
+            </a:r>
+            <a:endParaRPr lang="vi-VN" dirty="0"/>
+          </a:p>
+        </p:txBody>
+      </p:sp>
+    </p:spTree>
+    <p:extLst>
+      <p:ext uri="{BB962C8B-B14F-4D97-AF65-F5344CB8AC3E}">
+        <p14:creationId xmlns:p14="http://schemas.microsoft.com/office/powerpoint/2010/main" val="1981201201"/>
       </p:ext>
     </p:extLst>
   </p:cSld>

</xml_diff>